<commit_message>
+ barplots to plotting funcs, update figs & readme
</commit_message>
<xml_diff>
--- a/RISA_OUT/Figures_and_Tables/Fig2_draft.pptx
+++ b/RISA_OUT/Figures_and_Tables/Fig2_draft.pptx
@@ -53,7 +53,7 @@
       </p:grpSpPr>
       <p:sp>
         <p:nvSpPr>
-          <p:cNvPr id="22" name="PlaceHolder 1"/>
+          <p:cNvPr id="23" name="PlaceHolder 1"/>
           <p:cNvSpPr>
             <a:spLocks noGrp="1"/>
           </p:cNvSpPr>
@@ -64,7 +64,7 @@
         <p:spPr>
           <a:xfrm>
             <a:off x="504000" y="301320"/>
-            <a:ext cx="9071280" cy="1261440"/>
+            <a:ext cx="9070920" cy="1261080"/>
           </a:xfrm>
           <a:prstGeom prst="rect">
             <a:avLst/>
@@ -84,7 +84,7 @@
       </p:sp>
       <p:sp>
         <p:nvSpPr>
-          <p:cNvPr id="23" name="PlaceHolder 2"/>
+          <p:cNvPr id="24" name="PlaceHolder 2"/>
           <p:cNvSpPr>
             <a:spLocks noGrp="1"/>
           </p:cNvSpPr>
@@ -95,7 +95,7 @@
         <p:spPr>
           <a:xfrm>
             <a:off x="504000" y="1768680"/>
-            <a:ext cx="9072000" cy="2090880"/>
+            <a:ext cx="9071640" cy="2090880"/>
           </a:xfrm>
           <a:prstGeom prst="rect">
             <a:avLst/>
@@ -114,7 +114,7 @@
       </p:sp>
       <p:sp>
         <p:nvSpPr>
-          <p:cNvPr id="24" name="PlaceHolder 3"/>
+          <p:cNvPr id="25" name="PlaceHolder 3"/>
           <p:cNvSpPr>
             <a:spLocks noGrp="1"/>
           </p:cNvSpPr>
@@ -125,7 +125,7 @@
         <p:spPr>
           <a:xfrm>
             <a:off x="504000" y="4058640"/>
-            <a:ext cx="9072000" cy="2090880"/>
+            <a:ext cx="9071640" cy="2090880"/>
           </a:xfrm>
           <a:prstGeom prst="rect">
             <a:avLst/>
@@ -166,7 +166,7 @@
       </p:grpSpPr>
       <p:sp>
         <p:nvSpPr>
-          <p:cNvPr id="25" name="PlaceHolder 1"/>
+          <p:cNvPr id="26" name="PlaceHolder 1"/>
           <p:cNvSpPr>
             <a:spLocks noGrp="1"/>
           </p:cNvSpPr>
@@ -177,7 +177,7 @@
         <p:spPr>
           <a:xfrm>
             <a:off x="504000" y="301320"/>
-            <a:ext cx="9071280" cy="1261440"/>
+            <a:ext cx="9070920" cy="1261080"/>
           </a:xfrm>
           <a:prstGeom prst="rect">
             <a:avLst/>
@@ -197,7 +197,7 @@
       </p:sp>
       <p:sp>
         <p:nvSpPr>
-          <p:cNvPr id="26" name="PlaceHolder 2"/>
+          <p:cNvPr id="27" name="PlaceHolder 2"/>
           <p:cNvSpPr>
             <a:spLocks noGrp="1"/>
           </p:cNvSpPr>
@@ -227,7 +227,7 @@
       </p:sp>
       <p:sp>
         <p:nvSpPr>
-          <p:cNvPr id="27" name="PlaceHolder 3"/>
+          <p:cNvPr id="28" name="PlaceHolder 3"/>
           <p:cNvSpPr>
             <a:spLocks noGrp="1"/>
           </p:cNvSpPr>
@@ -257,7 +257,7 @@
       </p:sp>
       <p:sp>
         <p:nvSpPr>
-          <p:cNvPr id="28" name="PlaceHolder 4"/>
+          <p:cNvPr id="29" name="PlaceHolder 4"/>
           <p:cNvSpPr>
             <a:spLocks noGrp="1"/>
           </p:cNvSpPr>
@@ -287,7 +287,7 @@
       </p:sp>
       <p:sp>
         <p:nvSpPr>
-          <p:cNvPr id="29" name="PlaceHolder 5"/>
+          <p:cNvPr id="30" name="PlaceHolder 5"/>
           <p:cNvSpPr>
             <a:spLocks noGrp="1"/>
           </p:cNvSpPr>
@@ -339,7 +339,7 @@
       </p:grpSpPr>
       <p:sp>
         <p:nvSpPr>
-          <p:cNvPr id="30" name="PlaceHolder 1"/>
+          <p:cNvPr id="31" name="PlaceHolder 1"/>
           <p:cNvSpPr>
             <a:spLocks noGrp="1"/>
           </p:cNvSpPr>
@@ -350,7 +350,7 @@
         <p:spPr>
           <a:xfrm>
             <a:off x="504000" y="301320"/>
-            <a:ext cx="9071280" cy="1261440"/>
+            <a:ext cx="9070920" cy="1261080"/>
           </a:xfrm>
           <a:prstGeom prst="rect">
             <a:avLst/>
@@ -370,7 +370,7 @@
       </p:sp>
       <p:sp>
         <p:nvSpPr>
-          <p:cNvPr id="31" name="PlaceHolder 2"/>
+          <p:cNvPr id="32" name="PlaceHolder 2"/>
           <p:cNvSpPr>
             <a:spLocks noGrp="1"/>
           </p:cNvSpPr>
@@ -381,7 +381,7 @@
         <p:spPr>
           <a:xfrm>
             <a:off x="504000" y="1768680"/>
-            <a:ext cx="2921040" cy="2090880"/>
+            <a:ext cx="2920680" cy="2090880"/>
           </a:xfrm>
           <a:prstGeom prst="rect">
             <a:avLst/>
@@ -400,7 +400,7 @@
       </p:sp>
       <p:sp>
         <p:nvSpPr>
-          <p:cNvPr id="32" name="PlaceHolder 3"/>
+          <p:cNvPr id="33" name="PlaceHolder 3"/>
           <p:cNvSpPr>
             <a:spLocks noGrp="1"/>
           </p:cNvSpPr>
@@ -410,8 +410,8 @@
         </p:nvSpPr>
         <p:spPr>
           <a:xfrm>
-            <a:off x="3571560" y="1768680"/>
-            <a:ext cx="2921040" cy="2090880"/>
+            <a:off x="3571200" y="1768680"/>
+            <a:ext cx="2920680" cy="2090880"/>
           </a:xfrm>
           <a:prstGeom prst="rect">
             <a:avLst/>
@@ -430,7 +430,7 @@
       </p:sp>
       <p:sp>
         <p:nvSpPr>
-          <p:cNvPr id="33" name="PlaceHolder 4"/>
+          <p:cNvPr id="34" name="PlaceHolder 4"/>
           <p:cNvSpPr>
             <a:spLocks noGrp="1"/>
           </p:cNvSpPr>
@@ -440,8 +440,8 @@
         </p:nvSpPr>
         <p:spPr>
           <a:xfrm>
-            <a:off x="6639120" y="1768680"/>
-            <a:ext cx="2921040" cy="2090880"/>
+            <a:off x="6638040" y="1768680"/>
+            <a:ext cx="2920680" cy="2090880"/>
           </a:xfrm>
           <a:prstGeom prst="rect">
             <a:avLst/>
@@ -460,7 +460,7 @@
       </p:sp>
       <p:sp>
         <p:nvSpPr>
-          <p:cNvPr id="34" name="PlaceHolder 5"/>
+          <p:cNvPr id="35" name="PlaceHolder 5"/>
           <p:cNvSpPr>
             <a:spLocks noGrp="1"/>
           </p:cNvSpPr>
@@ -471,7 +471,7 @@
         <p:spPr>
           <a:xfrm>
             <a:off x="504000" y="4058640"/>
-            <a:ext cx="2921040" cy="2090880"/>
+            <a:ext cx="2920680" cy="2090880"/>
           </a:xfrm>
           <a:prstGeom prst="rect">
             <a:avLst/>
@@ -490,7 +490,7 @@
       </p:sp>
       <p:sp>
         <p:nvSpPr>
-          <p:cNvPr id="35" name="PlaceHolder 6"/>
+          <p:cNvPr id="36" name="PlaceHolder 6"/>
           <p:cNvSpPr>
             <a:spLocks noGrp="1"/>
           </p:cNvSpPr>
@@ -500,8 +500,8 @@
         </p:nvSpPr>
         <p:spPr>
           <a:xfrm>
-            <a:off x="3571560" y="4058640"/>
-            <a:ext cx="2921040" cy="2090880"/>
+            <a:off x="3571200" y="4058640"/>
+            <a:ext cx="2920680" cy="2090880"/>
           </a:xfrm>
           <a:prstGeom prst="rect">
             <a:avLst/>
@@ -520,7 +520,7 @@
       </p:sp>
       <p:sp>
         <p:nvSpPr>
-          <p:cNvPr id="36" name="PlaceHolder 7"/>
+          <p:cNvPr id="37" name="PlaceHolder 7"/>
           <p:cNvSpPr>
             <a:spLocks noGrp="1"/>
           </p:cNvSpPr>
@@ -530,8 +530,8 @@
         </p:nvSpPr>
         <p:spPr>
           <a:xfrm>
-            <a:off x="6639120" y="4058640"/>
-            <a:ext cx="2921040" cy="2090880"/>
+            <a:off x="6638040" y="4058640"/>
+            <a:ext cx="2920680" cy="2090880"/>
           </a:xfrm>
           <a:prstGeom prst="rect">
             <a:avLst/>
@@ -572,7 +572,7 @@
       </p:grpSpPr>
       <p:sp>
         <p:nvSpPr>
-          <p:cNvPr id="1" name="PlaceHolder 1"/>
+          <p:cNvPr id="2" name="PlaceHolder 1"/>
           <p:cNvSpPr>
             <a:spLocks noGrp="1"/>
           </p:cNvSpPr>
@@ -583,7 +583,7 @@
         <p:spPr>
           <a:xfrm>
             <a:off x="504000" y="301320"/>
-            <a:ext cx="9071280" cy="1261440"/>
+            <a:ext cx="9070920" cy="1261080"/>
           </a:xfrm>
           <a:prstGeom prst="rect">
             <a:avLst/>
@@ -603,7 +603,7 @@
       </p:sp>
       <p:sp>
         <p:nvSpPr>
-          <p:cNvPr id="2" name="PlaceHolder 2"/>
+          <p:cNvPr id="3" name="PlaceHolder 2"/>
           <p:cNvSpPr>
             <a:spLocks noGrp="1"/>
           </p:cNvSpPr>
@@ -614,7 +614,7 @@
         <p:spPr>
           <a:xfrm>
             <a:off x="504000" y="1768680"/>
-            <a:ext cx="9072000" cy="4384080"/>
+            <a:ext cx="9071640" cy="4383720"/>
           </a:xfrm>
           <a:prstGeom prst="rect">
             <a:avLst/>
@@ -656,7 +656,7 @@
       </p:grpSpPr>
       <p:sp>
         <p:nvSpPr>
-          <p:cNvPr id="3" name="PlaceHolder 1"/>
+          <p:cNvPr id="4" name="PlaceHolder 1"/>
           <p:cNvSpPr>
             <a:spLocks noGrp="1"/>
           </p:cNvSpPr>
@@ -667,7 +667,7 @@
         <p:spPr>
           <a:xfrm>
             <a:off x="504000" y="301320"/>
-            <a:ext cx="9071280" cy="1261440"/>
+            <a:ext cx="9070920" cy="1261080"/>
           </a:xfrm>
           <a:prstGeom prst="rect">
             <a:avLst/>
@@ -687,7 +687,7 @@
       </p:sp>
       <p:sp>
         <p:nvSpPr>
-          <p:cNvPr id="4" name="PlaceHolder 2"/>
+          <p:cNvPr id="5" name="PlaceHolder 2"/>
           <p:cNvSpPr>
             <a:spLocks noGrp="1"/>
           </p:cNvSpPr>
@@ -698,7 +698,7 @@
         <p:spPr>
           <a:xfrm>
             <a:off x="504000" y="1768680"/>
-            <a:ext cx="9072000" cy="4384080"/>
+            <a:ext cx="9071640" cy="4383720"/>
           </a:xfrm>
           <a:prstGeom prst="rect">
             <a:avLst/>
@@ -739,7 +739,7 @@
       </p:grpSpPr>
       <p:sp>
         <p:nvSpPr>
-          <p:cNvPr id="5" name="PlaceHolder 1"/>
+          <p:cNvPr id="6" name="PlaceHolder 1"/>
           <p:cNvSpPr>
             <a:spLocks noGrp="1"/>
           </p:cNvSpPr>
@@ -750,7 +750,7 @@
         <p:spPr>
           <a:xfrm>
             <a:off x="504000" y="301320"/>
-            <a:ext cx="9071280" cy="1261440"/>
+            <a:ext cx="9070920" cy="1261080"/>
           </a:xfrm>
           <a:prstGeom prst="rect">
             <a:avLst/>
@@ -770,7 +770,7 @@
       </p:sp>
       <p:sp>
         <p:nvSpPr>
-          <p:cNvPr id="6" name="PlaceHolder 2"/>
+          <p:cNvPr id="7" name="PlaceHolder 2"/>
           <p:cNvSpPr>
             <a:spLocks noGrp="1"/>
           </p:cNvSpPr>
@@ -781,7 +781,7 @@
         <p:spPr>
           <a:xfrm>
             <a:off x="504000" y="1768680"/>
-            <a:ext cx="4426920" cy="4384080"/>
+            <a:ext cx="4426920" cy="4383720"/>
           </a:xfrm>
           <a:prstGeom prst="rect">
             <a:avLst/>
@@ -800,7 +800,7 @@
       </p:sp>
       <p:sp>
         <p:nvSpPr>
-          <p:cNvPr id="7" name="PlaceHolder 3"/>
+          <p:cNvPr id="8" name="PlaceHolder 3"/>
           <p:cNvSpPr>
             <a:spLocks noGrp="1"/>
           </p:cNvSpPr>
@@ -811,7 +811,7 @@
         <p:spPr>
           <a:xfrm>
             <a:off x="5152680" y="1768680"/>
-            <a:ext cx="4426920" cy="4384080"/>
+            <a:ext cx="4426920" cy="4383720"/>
           </a:xfrm>
           <a:prstGeom prst="rect">
             <a:avLst/>
@@ -852,7 +852,7 @@
       </p:grpSpPr>
       <p:sp>
         <p:nvSpPr>
-          <p:cNvPr id="8" name="PlaceHolder 1"/>
+          <p:cNvPr id="9" name="PlaceHolder 1"/>
           <p:cNvSpPr>
             <a:spLocks noGrp="1"/>
           </p:cNvSpPr>
@@ -863,7 +863,7 @@
         <p:spPr>
           <a:xfrm>
             <a:off x="504000" y="301320"/>
-            <a:ext cx="9071280" cy="1261440"/>
+            <a:ext cx="9070920" cy="1261080"/>
           </a:xfrm>
           <a:prstGeom prst="rect">
             <a:avLst/>
@@ -905,7 +905,7 @@
       </p:grpSpPr>
       <p:sp>
         <p:nvSpPr>
-          <p:cNvPr id="9" name="PlaceHolder 1"/>
+          <p:cNvPr id="10" name="PlaceHolder 1"/>
           <p:cNvSpPr>
             <a:spLocks noGrp="1"/>
           </p:cNvSpPr>
@@ -916,7 +916,7 @@
         <p:spPr>
           <a:xfrm>
             <a:off x="504000" y="301320"/>
-            <a:ext cx="9071280" cy="5848560"/>
+            <a:ext cx="9070920" cy="5846760"/>
           </a:xfrm>
           <a:prstGeom prst="rect">
             <a:avLst/>
@@ -958,7 +958,7 @@
       </p:grpSpPr>
       <p:sp>
         <p:nvSpPr>
-          <p:cNvPr id="10" name="PlaceHolder 1"/>
+          <p:cNvPr id="11" name="PlaceHolder 1"/>
           <p:cNvSpPr>
             <a:spLocks noGrp="1"/>
           </p:cNvSpPr>
@@ -969,7 +969,7 @@
         <p:spPr>
           <a:xfrm>
             <a:off x="504000" y="301320"/>
-            <a:ext cx="9071280" cy="1261440"/>
+            <a:ext cx="9070920" cy="1261080"/>
           </a:xfrm>
           <a:prstGeom prst="rect">
             <a:avLst/>
@@ -989,7 +989,7 @@
       </p:sp>
       <p:sp>
         <p:nvSpPr>
-          <p:cNvPr id="11" name="PlaceHolder 2"/>
+          <p:cNvPr id="12" name="PlaceHolder 2"/>
           <p:cNvSpPr>
             <a:spLocks noGrp="1"/>
           </p:cNvSpPr>
@@ -1019,7 +1019,7 @@
       </p:sp>
       <p:sp>
         <p:nvSpPr>
-          <p:cNvPr id="12" name="PlaceHolder 3"/>
+          <p:cNvPr id="13" name="PlaceHolder 3"/>
           <p:cNvSpPr>
             <a:spLocks noGrp="1"/>
           </p:cNvSpPr>
@@ -1030,7 +1030,7 @@
         <p:spPr>
           <a:xfrm>
             <a:off x="5152680" y="1768680"/>
-            <a:ext cx="4426920" cy="4384080"/>
+            <a:ext cx="4426920" cy="4383720"/>
           </a:xfrm>
           <a:prstGeom prst="rect">
             <a:avLst/>
@@ -1049,7 +1049,7 @@
       </p:sp>
       <p:sp>
         <p:nvSpPr>
-          <p:cNvPr id="13" name="PlaceHolder 4"/>
+          <p:cNvPr id="14" name="PlaceHolder 4"/>
           <p:cNvSpPr>
             <a:spLocks noGrp="1"/>
           </p:cNvSpPr>
@@ -1101,7 +1101,7 @@
       </p:grpSpPr>
       <p:sp>
         <p:nvSpPr>
-          <p:cNvPr id="14" name="PlaceHolder 1"/>
+          <p:cNvPr id="15" name="PlaceHolder 1"/>
           <p:cNvSpPr>
             <a:spLocks noGrp="1"/>
           </p:cNvSpPr>
@@ -1112,7 +1112,7 @@
         <p:spPr>
           <a:xfrm>
             <a:off x="504000" y="301320"/>
-            <a:ext cx="9071280" cy="1261440"/>
+            <a:ext cx="9070920" cy="1261080"/>
           </a:xfrm>
           <a:prstGeom prst="rect">
             <a:avLst/>
@@ -1132,7 +1132,7 @@
       </p:sp>
       <p:sp>
         <p:nvSpPr>
-          <p:cNvPr id="15" name="PlaceHolder 2"/>
+          <p:cNvPr id="16" name="PlaceHolder 2"/>
           <p:cNvSpPr>
             <a:spLocks noGrp="1"/>
           </p:cNvSpPr>
@@ -1143,7 +1143,7 @@
         <p:spPr>
           <a:xfrm>
             <a:off x="504000" y="1768680"/>
-            <a:ext cx="4426920" cy="4384080"/>
+            <a:ext cx="4426920" cy="4383720"/>
           </a:xfrm>
           <a:prstGeom prst="rect">
             <a:avLst/>
@@ -1162,7 +1162,7 @@
       </p:sp>
       <p:sp>
         <p:nvSpPr>
-          <p:cNvPr id="16" name="PlaceHolder 3"/>
+          <p:cNvPr id="17" name="PlaceHolder 3"/>
           <p:cNvSpPr>
             <a:spLocks noGrp="1"/>
           </p:cNvSpPr>
@@ -1192,7 +1192,7 @@
       </p:sp>
       <p:sp>
         <p:nvSpPr>
-          <p:cNvPr id="17" name="PlaceHolder 4"/>
+          <p:cNvPr id="18" name="PlaceHolder 4"/>
           <p:cNvSpPr>
             <a:spLocks noGrp="1"/>
           </p:cNvSpPr>
@@ -1244,7 +1244,7 @@
       </p:grpSpPr>
       <p:sp>
         <p:nvSpPr>
-          <p:cNvPr id="18" name="PlaceHolder 1"/>
+          <p:cNvPr id="19" name="PlaceHolder 1"/>
           <p:cNvSpPr>
             <a:spLocks noGrp="1"/>
           </p:cNvSpPr>
@@ -1255,7 +1255,7 @@
         <p:spPr>
           <a:xfrm>
             <a:off x="504000" y="301320"/>
-            <a:ext cx="9071280" cy="1261440"/>
+            <a:ext cx="9070920" cy="1261080"/>
           </a:xfrm>
           <a:prstGeom prst="rect">
             <a:avLst/>
@@ -1275,7 +1275,7 @@
       </p:sp>
       <p:sp>
         <p:nvSpPr>
-          <p:cNvPr id="19" name="PlaceHolder 2"/>
+          <p:cNvPr id="20" name="PlaceHolder 2"/>
           <p:cNvSpPr>
             <a:spLocks noGrp="1"/>
           </p:cNvSpPr>
@@ -1305,7 +1305,7 @@
       </p:sp>
       <p:sp>
         <p:nvSpPr>
-          <p:cNvPr id="20" name="PlaceHolder 3"/>
+          <p:cNvPr id="21" name="PlaceHolder 3"/>
           <p:cNvSpPr>
             <a:spLocks noGrp="1"/>
           </p:cNvSpPr>
@@ -1335,7 +1335,7 @@
       </p:sp>
       <p:sp>
         <p:nvSpPr>
-          <p:cNvPr id="21" name="PlaceHolder 4"/>
+          <p:cNvPr id="22" name="PlaceHolder 4"/>
           <p:cNvSpPr>
             <a:spLocks noGrp="1"/>
           </p:cNvSpPr>
@@ -1346,7 +1346,7 @@
         <p:spPr>
           <a:xfrm>
             <a:off x="504000" y="4058640"/>
-            <a:ext cx="9072000" cy="2090880"/>
+            <a:ext cx="9071640" cy="2090880"/>
           </a:xfrm>
           <a:prstGeom prst="rect">
             <a:avLst/>
@@ -1398,7 +1398,7 @@
         <p:spPr>
           <a:xfrm>
             <a:off x="504000" y="301320"/>
-            <a:ext cx="9071280" cy="1261440"/>
+            <a:ext cx="9070920" cy="1261080"/>
           </a:xfrm>
           <a:prstGeom prst="rect">
             <a:avLst/>
@@ -1415,6 +1415,185 @@
                 <a:latin typeface="Arial"/>
               </a:rPr>
               <a:t>Click to edit the title text format</a:t>
+            </a:r>
+            <a:endParaRPr b="0" lang="en-GB" sz="1800" spc="-1" strike="noStrike">
+              <a:latin typeface="Arial"/>
+            </a:endParaRPr>
+          </a:p>
+        </p:txBody>
+      </p:sp>
+      <p:sp>
+        <p:nvSpPr>
+          <p:cNvPr id="1" name="PlaceHolder 2"/>
+          <p:cNvSpPr>
+            <a:spLocks noGrp="1"/>
+          </p:cNvSpPr>
+          <p:nvPr>
+            <p:ph type="body"/>
+          </p:nvPr>
+        </p:nvSpPr>
+        <p:spPr>
+          <a:xfrm>
+            <a:off x="504000" y="1768680"/>
+            <a:ext cx="9071640" cy="4383720"/>
+          </a:xfrm>
+          <a:prstGeom prst="rect">
+            <a:avLst/>
+          </a:prstGeom>
+        </p:spPr>
+        <p:txBody>
+          <a:bodyPr lIns="0" rIns="0" tIns="0" bIns="0">
+            <a:normAutofit/>
+          </a:bodyPr>
+          <a:p>
+            <a:pPr marL="432000" indent="-324000" algn="ctr">
+              <a:spcBef>
+                <a:spcPts val="1417"/>
+              </a:spcBef>
+              <a:buClr>
+                <a:srgbClr val="000000"/>
+              </a:buClr>
+              <a:buSzPct val="45000"/>
+              <a:buFont typeface="Wingdings" charset="2"/>
+              <a:buChar char=""/>
+            </a:pPr>
+            <a:r>
+              <a:rPr b="0" lang="en-GB" sz="1800" spc="-1" strike="noStrike">
+                <a:latin typeface="Arial"/>
+              </a:rPr>
+              <a:t>Click to edit the outline text format</a:t>
+            </a:r>
+            <a:endParaRPr b="0" lang="en-GB" sz="1800" spc="-1" strike="noStrike">
+              <a:latin typeface="Arial"/>
+            </a:endParaRPr>
+          </a:p>
+          <a:p>
+            <a:pPr lvl="1" marL="864000" indent="-324000" algn="ctr">
+              <a:spcBef>
+                <a:spcPts val="1134"/>
+              </a:spcBef>
+              <a:buClr>
+                <a:srgbClr val="000000"/>
+              </a:buClr>
+              <a:buSzPct val="75000"/>
+              <a:buFont typeface="Symbol" charset="2"/>
+              <a:buChar char=""/>
+            </a:pPr>
+            <a:r>
+              <a:rPr b="0" lang="en-GB" sz="1800" spc="-1" strike="noStrike">
+                <a:latin typeface="Arial"/>
+              </a:rPr>
+              <a:t>Second Outline Level</a:t>
+            </a:r>
+            <a:endParaRPr b="0" lang="en-GB" sz="1800" spc="-1" strike="noStrike">
+              <a:latin typeface="Arial"/>
+            </a:endParaRPr>
+          </a:p>
+          <a:p>
+            <a:pPr lvl="2" marL="1296000" indent="-288000" algn="ctr">
+              <a:spcBef>
+                <a:spcPts val="850"/>
+              </a:spcBef>
+              <a:buClr>
+                <a:srgbClr val="000000"/>
+              </a:buClr>
+              <a:buSzPct val="45000"/>
+              <a:buFont typeface="Wingdings" charset="2"/>
+              <a:buChar char=""/>
+            </a:pPr>
+            <a:r>
+              <a:rPr b="0" lang="en-GB" sz="1800" spc="-1" strike="noStrike">
+                <a:latin typeface="Arial"/>
+              </a:rPr>
+              <a:t>Third Outline Level</a:t>
+            </a:r>
+            <a:endParaRPr b="0" lang="en-GB" sz="1800" spc="-1" strike="noStrike">
+              <a:latin typeface="Arial"/>
+            </a:endParaRPr>
+          </a:p>
+          <a:p>
+            <a:pPr lvl="3" marL="1728000" indent="-216000" algn="ctr">
+              <a:spcBef>
+                <a:spcPts val="567"/>
+              </a:spcBef>
+              <a:buClr>
+                <a:srgbClr val="000000"/>
+              </a:buClr>
+              <a:buSzPct val="75000"/>
+              <a:buFont typeface="Symbol" charset="2"/>
+              <a:buChar char=""/>
+            </a:pPr>
+            <a:r>
+              <a:rPr b="0" lang="en-GB" sz="1800" spc="-1" strike="noStrike">
+                <a:latin typeface="Arial"/>
+              </a:rPr>
+              <a:t>Fourth Outline Level</a:t>
+            </a:r>
+            <a:endParaRPr b="0" lang="en-GB" sz="1800" spc="-1" strike="noStrike">
+              <a:latin typeface="Arial"/>
+            </a:endParaRPr>
+          </a:p>
+          <a:p>
+            <a:pPr lvl="4" marL="2160000" indent="-216000" algn="ctr">
+              <a:spcBef>
+                <a:spcPts val="283"/>
+              </a:spcBef>
+              <a:buClr>
+                <a:srgbClr val="000000"/>
+              </a:buClr>
+              <a:buSzPct val="45000"/>
+              <a:buFont typeface="Wingdings" charset="2"/>
+              <a:buChar char=""/>
+            </a:pPr>
+            <a:r>
+              <a:rPr b="0" lang="en-GB" sz="1800" spc="-1" strike="noStrike">
+                <a:latin typeface="Arial"/>
+              </a:rPr>
+              <a:t>Fifth Outline Level</a:t>
+            </a:r>
+            <a:endParaRPr b="0" lang="en-GB" sz="1800" spc="-1" strike="noStrike">
+              <a:latin typeface="Arial"/>
+            </a:endParaRPr>
+          </a:p>
+          <a:p>
+            <a:pPr lvl="5" marL="2592000" indent="-216000" algn="ctr">
+              <a:spcBef>
+                <a:spcPts val="283"/>
+              </a:spcBef>
+              <a:buClr>
+                <a:srgbClr val="000000"/>
+              </a:buClr>
+              <a:buSzPct val="45000"/>
+              <a:buFont typeface="Wingdings" charset="2"/>
+              <a:buChar char=""/>
+            </a:pPr>
+            <a:r>
+              <a:rPr b="0" lang="en-GB" sz="1800" spc="-1" strike="noStrike">
+                <a:latin typeface="Arial"/>
+              </a:rPr>
+              <a:t>Sixth Outline Level</a:t>
+            </a:r>
+            <a:endParaRPr b="0" lang="en-GB" sz="1800" spc="-1" strike="noStrike">
+              <a:latin typeface="Arial"/>
+            </a:endParaRPr>
+          </a:p>
+          <a:p>
+            <a:pPr lvl="6" marL="3024000" indent="-216000" algn="ctr">
+              <a:spcBef>
+                <a:spcPts val="283"/>
+              </a:spcBef>
+              <a:buClr>
+                <a:srgbClr val="000000"/>
+              </a:buClr>
+              <a:buSzPct val="45000"/>
+              <a:buFont typeface="Wingdings" charset="2"/>
+              <a:buChar char=""/>
+            </a:pPr>
+            <a:r>
+              <a:rPr b="0" lang="en-GB" sz="1800" spc="-1" strike="noStrike">
+                <a:latin typeface="Arial"/>
+              </a:rPr>
+              <a:t>Seventh Outline Level</a:t>
             </a:r>
             <a:endParaRPr b="0" lang="en-GB" sz="1800" spc="-1" strike="noStrike">
               <a:latin typeface="Arial"/>
@@ -1461,43 +1640,19 @@
       </p:grpSpPr>
       <p:pic>
         <p:nvPicPr>
-          <p:cNvPr id="37" name="" descr=""/>
+          <p:cNvPr id="38" name="" descr=""/>
           <p:cNvPicPr/>
           <p:nvPr/>
         </p:nvPicPr>
         <p:blipFill>
           <a:blip r:embed="rId1"/>
-          <a:srcRect l="0" t="10650" r="9453" b="8122"/>
+          <a:srcRect l="8587" t="0" r="626" b="5606"/>
           <a:stretch/>
         </p:blipFill>
         <p:spPr>
           <a:xfrm>
-            <a:off x="5112000" y="576000"/>
-            <a:ext cx="4895640" cy="4391640"/>
-          </a:xfrm>
-          <a:prstGeom prst="rect">
-            <a:avLst/>
-          </a:prstGeom>
-          <a:ln>
-            <a:noFill/>
-          </a:ln>
-        </p:spPr>
-      </p:pic>
-      <p:pic>
-        <p:nvPicPr>
-          <p:cNvPr id="38" name="" descr=""/>
-          <p:cNvPicPr/>
-          <p:nvPr/>
-        </p:nvPicPr>
-        <p:blipFill>
-          <a:blip r:embed="rId2"/>
-          <a:srcRect l="2872" t="0" r="851" b="2276"/>
-          <a:stretch/>
-        </p:blipFill>
-        <p:spPr>
-          <a:xfrm>
-            <a:off x="144000" y="540000"/>
-            <a:ext cx="4823640" cy="4643640"/>
+            <a:off x="5832000" y="720000"/>
+            <a:ext cx="4183200" cy="4247640"/>
           </a:xfrm>
           <a:prstGeom prst="rect">
             <a:avLst/>
@@ -1515,15 +1670,19 @@
         </p:nvSpPr>
         <p:spPr>
           <a:xfrm>
-            <a:off x="36000" y="576000"/>
-            <a:ext cx="719640" cy="345960"/>
-          </a:xfrm>
-          <a:prstGeom prst="rect">
-            <a:avLst/>
-          </a:prstGeom>
-          <a:noFill/>
-          <a:ln>
-            <a:noFill/>
+            <a:off x="5832000" y="3456000"/>
+            <a:ext cx="4183200" cy="360000"/>
+          </a:xfrm>
+          <a:prstGeom prst="rect">
+            <a:avLst/>
+          </a:prstGeom>
+          <a:solidFill>
+            <a:srgbClr val="ffffff"/>
+          </a:solidFill>
+          <a:ln>
+            <a:solidFill>
+              <a:srgbClr val="ffffff"/>
+            </a:solidFill>
           </a:ln>
         </p:spPr>
         <p:style>
@@ -1532,38 +1691,41 @@
           <a:effectRef idx="0"/>
           <a:fontRef idx="minor"/>
         </p:style>
-        <p:txBody>
-          <a:bodyPr lIns="90000" rIns="90000" tIns="45000" bIns="45000">
-            <a:noAutofit/>
-          </a:bodyPr>
-          <a:p>
-            <a:pPr>
-              <a:lnSpc>
-                <a:spcPct val="100000"/>
-              </a:lnSpc>
-            </a:pPr>
-            <a:r>
-              <a:rPr b="0" lang="en-GB" sz="1800" spc="-1" strike="noStrike">
-                <a:latin typeface="Arial"/>
-              </a:rPr>
-              <a:t>A</a:t>
-            </a:r>
-            <a:endParaRPr b="0" lang="en-GB" sz="1800" spc="-1" strike="noStrike">
-              <a:latin typeface="Arial"/>
-            </a:endParaRPr>
-          </a:p>
-        </p:txBody>
-      </p:sp>
-      <p:sp>
-        <p:nvSpPr>
-          <p:cNvPr id="40" name="CustomShape 2"/>
+      </p:sp>
+      <p:pic>
+        <p:nvPicPr>
+          <p:cNvPr id="40" name="" descr=""/>
+          <p:cNvPicPr/>
+          <p:nvPr/>
+        </p:nvPicPr>
+        <p:blipFill>
+          <a:blip r:embed="rId2"/>
+          <a:srcRect l="11993" t="10940" r="9016" b="11673"/>
+          <a:stretch/>
+        </p:blipFill>
+        <p:spPr>
+          <a:xfrm>
+            <a:off x="504000" y="828000"/>
+            <a:ext cx="4272480" cy="4211640"/>
+          </a:xfrm>
+          <a:prstGeom prst="rect">
+            <a:avLst/>
+          </a:prstGeom>
+          <a:ln>
+            <a:noFill/>
+          </a:ln>
+        </p:spPr>
+      </p:pic>
+      <p:sp>
+        <p:nvSpPr>
+          <p:cNvPr id="41" name="CustomShape 2"/>
           <p:cNvSpPr/>
           <p:nvPr/>
         </p:nvSpPr>
         <p:spPr>
           <a:xfrm>
-            <a:off x="5011920" y="555120"/>
-            <a:ext cx="719640" cy="345960"/>
+            <a:off x="72000" y="540000"/>
+            <a:ext cx="719280" cy="345600"/>
           </a:xfrm>
           <a:prstGeom prst="rect">
             <a:avLst/>
@@ -1591,9 +1753,13 @@
             </a:pPr>
             <a:r>
               <a:rPr b="0" lang="en-GB" sz="1800" spc="-1" strike="noStrike">
-                <a:latin typeface="Arial"/>
-              </a:rPr>
-              <a:t>B</a:t>
+                <a:solidFill>
+                  <a:srgbClr val="000000"/>
+                </a:solidFill>
+                <a:latin typeface="Arial"/>
+                <a:ea typeface="DejaVu Sans"/>
+              </a:rPr>
+              <a:t>A</a:t>
             </a:r>
             <a:endParaRPr b="0" lang="en-GB" sz="1800" spc="-1" strike="noStrike">
               <a:latin typeface="Arial"/>
@@ -1603,14 +1769,14 @@
       </p:sp>
       <p:sp>
         <p:nvSpPr>
-          <p:cNvPr id="41" name="CustomShape 3"/>
+          <p:cNvPr id="42" name="CustomShape 3"/>
           <p:cNvSpPr/>
           <p:nvPr/>
         </p:nvSpPr>
         <p:spPr>
           <a:xfrm>
-            <a:off x="5010480" y="2016000"/>
-            <a:ext cx="719640" cy="345960"/>
+            <a:off x="5832000" y="813600"/>
+            <a:ext cx="719280" cy="345600"/>
           </a:xfrm>
           <a:prstGeom prst="rect">
             <a:avLst/>
@@ -1638,9 +1804,13 @@
             </a:pPr>
             <a:r>
               <a:rPr b="0" lang="en-GB" sz="1800" spc="-1" strike="noStrike">
-                <a:latin typeface="Arial"/>
-              </a:rPr>
-              <a:t>C</a:t>
+                <a:solidFill>
+                  <a:srgbClr val="000000"/>
+                </a:solidFill>
+                <a:latin typeface="Arial"/>
+                <a:ea typeface="DejaVu Sans"/>
+              </a:rPr>
+              <a:t>B</a:t>
             </a:r>
             <a:endParaRPr b="0" lang="en-GB" sz="1800" spc="-1" strike="noStrike">
               <a:latin typeface="Arial"/>
@@ -1650,21 +1820,1562 @@
       </p:sp>
       <p:sp>
         <p:nvSpPr>
-          <p:cNvPr id="42" name="CustomShape 4"/>
+          <p:cNvPr id="43" name="TextShape 4"/>
+          <p:cNvSpPr txBox="1"/>
+          <p:nvPr/>
+        </p:nvSpPr>
+        <p:spPr>
+          <a:xfrm>
+            <a:off x="504000" y="5017680"/>
+            <a:ext cx="504000" cy="232200"/>
+          </a:xfrm>
+          <a:prstGeom prst="rect">
+            <a:avLst/>
+          </a:prstGeom>
+          <a:noFill/>
+          <a:ln>
+            <a:noFill/>
+          </a:ln>
+        </p:spPr>
+        <p:txBody>
+          <a:bodyPr lIns="90000" rIns="90000" tIns="45000" bIns="45000">
+            <a:noAutofit/>
+          </a:bodyPr>
+          <a:p>
+            <a:r>
+              <a:rPr b="0" lang="en-GB" sz="1000" spc="-1" strike="noStrike">
+                <a:latin typeface="Arial"/>
+              </a:rPr>
+              <a:t>0.3</a:t>
+            </a:r>
+            <a:endParaRPr b="0" lang="en-GB" sz="1000" spc="-1" strike="noStrike">
+              <a:latin typeface="Arial"/>
+            </a:endParaRPr>
+          </a:p>
+        </p:txBody>
+      </p:sp>
+      <p:sp>
+        <p:nvSpPr>
+          <p:cNvPr id="44" name="TextShape 5"/>
+          <p:cNvSpPr txBox="1"/>
+          <p:nvPr/>
+        </p:nvSpPr>
+        <p:spPr>
+          <a:xfrm>
+            <a:off x="1512000" y="5053680"/>
+            <a:ext cx="504000" cy="232200"/>
+          </a:xfrm>
+          <a:prstGeom prst="rect">
+            <a:avLst/>
+          </a:prstGeom>
+          <a:noFill/>
+          <a:ln>
+            <a:noFill/>
+          </a:ln>
+        </p:spPr>
+        <p:txBody>
+          <a:bodyPr lIns="90000" rIns="90000" tIns="45000" bIns="45000">
+            <a:noAutofit/>
+          </a:bodyPr>
+          <a:p>
+            <a:r>
+              <a:rPr b="0" lang="en-GB" sz="1000" spc="-1" strike="noStrike">
+                <a:latin typeface="Arial"/>
+              </a:rPr>
+              <a:t>0.4</a:t>
+            </a:r>
+            <a:endParaRPr b="0" lang="en-GB" sz="1000" spc="-1" strike="noStrike">
+              <a:latin typeface="Arial"/>
+            </a:endParaRPr>
+          </a:p>
+        </p:txBody>
+      </p:sp>
+      <p:sp>
+        <p:nvSpPr>
+          <p:cNvPr id="45" name="TextShape 6"/>
+          <p:cNvSpPr txBox="1"/>
+          <p:nvPr/>
+        </p:nvSpPr>
+        <p:spPr>
+          <a:xfrm>
+            <a:off x="2448000" y="5053680"/>
+            <a:ext cx="504000" cy="232200"/>
+          </a:xfrm>
+          <a:prstGeom prst="rect">
+            <a:avLst/>
+          </a:prstGeom>
+          <a:noFill/>
+          <a:ln>
+            <a:noFill/>
+          </a:ln>
+        </p:spPr>
+        <p:txBody>
+          <a:bodyPr lIns="90000" rIns="90000" tIns="45000" bIns="45000">
+            <a:noAutofit/>
+          </a:bodyPr>
+          <a:p>
+            <a:r>
+              <a:rPr b="0" lang="en-GB" sz="1000" spc="-1" strike="noStrike">
+                <a:latin typeface="Arial"/>
+              </a:rPr>
+              <a:t>0.5</a:t>
+            </a:r>
+            <a:endParaRPr b="0" lang="en-GB" sz="1000" spc="-1" strike="noStrike">
+              <a:latin typeface="Arial"/>
+            </a:endParaRPr>
+          </a:p>
+        </p:txBody>
+      </p:sp>
+      <p:sp>
+        <p:nvSpPr>
+          <p:cNvPr id="46" name="TextShape 7"/>
+          <p:cNvSpPr txBox="1"/>
+          <p:nvPr/>
+        </p:nvSpPr>
+        <p:spPr>
+          <a:xfrm>
+            <a:off x="3420000" y="5053680"/>
+            <a:ext cx="504000" cy="232200"/>
+          </a:xfrm>
+          <a:prstGeom prst="rect">
+            <a:avLst/>
+          </a:prstGeom>
+          <a:noFill/>
+          <a:ln>
+            <a:noFill/>
+          </a:ln>
+        </p:spPr>
+        <p:txBody>
+          <a:bodyPr lIns="90000" rIns="90000" tIns="45000" bIns="45000">
+            <a:noAutofit/>
+          </a:bodyPr>
+          <a:p>
+            <a:r>
+              <a:rPr b="0" lang="en-GB" sz="1000" spc="-1" strike="noStrike">
+                <a:latin typeface="Arial"/>
+              </a:rPr>
+              <a:t>0.6</a:t>
+            </a:r>
+            <a:endParaRPr b="0" lang="en-GB" sz="1000" spc="-1" strike="noStrike">
+              <a:latin typeface="Arial"/>
+            </a:endParaRPr>
+          </a:p>
+        </p:txBody>
+      </p:sp>
+      <p:sp>
+        <p:nvSpPr>
+          <p:cNvPr id="47" name="TextShape 8"/>
+          <p:cNvSpPr txBox="1"/>
+          <p:nvPr/>
+        </p:nvSpPr>
+        <p:spPr>
+          <a:xfrm>
+            <a:off x="4356000" y="5053680"/>
+            <a:ext cx="504000" cy="232200"/>
+          </a:xfrm>
+          <a:prstGeom prst="rect">
+            <a:avLst/>
+          </a:prstGeom>
+          <a:noFill/>
+          <a:ln>
+            <a:noFill/>
+          </a:ln>
+        </p:spPr>
+        <p:txBody>
+          <a:bodyPr lIns="90000" rIns="90000" tIns="45000" bIns="45000">
+            <a:noAutofit/>
+          </a:bodyPr>
+          <a:p>
+            <a:r>
+              <a:rPr b="0" lang="en-GB" sz="1000" spc="-1" strike="noStrike">
+                <a:latin typeface="Arial"/>
+              </a:rPr>
+              <a:t>0.7</a:t>
+            </a:r>
+            <a:endParaRPr b="0" lang="en-GB" sz="1000" spc="-1" strike="noStrike">
+              <a:latin typeface="Arial"/>
+            </a:endParaRPr>
+          </a:p>
+        </p:txBody>
+      </p:sp>
+      <p:sp>
+        <p:nvSpPr>
+          <p:cNvPr id="48" name="TextShape 9"/>
+          <p:cNvSpPr txBox="1"/>
+          <p:nvPr/>
+        </p:nvSpPr>
+        <p:spPr>
+          <a:xfrm>
+            <a:off x="1728000" y="5269680"/>
+            <a:ext cx="2088000" cy="274320"/>
+          </a:xfrm>
+          <a:prstGeom prst="rect">
+            <a:avLst/>
+          </a:prstGeom>
+          <a:noFill/>
+          <a:ln>
+            <a:noFill/>
+          </a:ln>
+        </p:spPr>
+        <p:txBody>
+          <a:bodyPr lIns="90000" rIns="90000" tIns="45000" bIns="45000">
+            <a:noAutofit/>
+          </a:bodyPr>
+          <a:p>
+            <a:r>
+              <a:rPr b="0" lang="en-GB" sz="1000" spc="-1" strike="noStrike">
+                <a:latin typeface="Arial"/>
+              </a:rPr>
+              <a:t>Wavelength (</a:t>
+            </a:r>
+            <a:r>
+              <a:rPr b="0" lang="en-GB" sz="1000" spc="-1" strike="noStrike">
+                <a:latin typeface="Times New Roman"/>
+                <a:ea typeface="Times New Roman"/>
+              </a:rPr>
+              <a:t>μ</a:t>
+            </a:r>
+            <a:r>
+              <a:rPr b="0" lang="en-GB" sz="1000" spc="-1" strike="noStrike">
+                <a:latin typeface="Arial"/>
+              </a:rPr>
+              <a:t>m)</a:t>
+            </a:r>
+            <a:endParaRPr b="0" lang="en-GB" sz="1000" spc="-1" strike="noStrike">
+              <a:latin typeface="Arial"/>
+            </a:endParaRPr>
+          </a:p>
+        </p:txBody>
+      </p:sp>
+      <p:sp>
+        <p:nvSpPr>
+          <p:cNvPr id="49" name="TextShape 10"/>
+          <p:cNvSpPr txBox="1"/>
+          <p:nvPr/>
+        </p:nvSpPr>
+        <p:spPr>
+          <a:xfrm>
+            <a:off x="216000" y="4677840"/>
+            <a:ext cx="504000" cy="232200"/>
+          </a:xfrm>
+          <a:prstGeom prst="rect">
+            <a:avLst/>
+          </a:prstGeom>
+          <a:noFill/>
+          <a:ln>
+            <a:noFill/>
+          </a:ln>
+        </p:spPr>
+        <p:txBody>
+          <a:bodyPr lIns="90000" rIns="90000" tIns="45000" bIns="45000">
+            <a:noAutofit/>
+          </a:bodyPr>
+          <a:p>
+            <a:r>
+              <a:rPr b="0" lang="en-GB" sz="1000" spc="-1" strike="noStrike">
+                <a:latin typeface="Arial"/>
+              </a:rPr>
+              <a:t>0</a:t>
+            </a:r>
+            <a:endParaRPr b="0" lang="en-GB" sz="1000" spc="-1" strike="noStrike">
+              <a:latin typeface="Arial"/>
+            </a:endParaRPr>
+          </a:p>
+        </p:txBody>
+      </p:sp>
+      <p:sp>
+        <p:nvSpPr>
+          <p:cNvPr id="50" name="TextShape 11"/>
+          <p:cNvSpPr txBox="1"/>
+          <p:nvPr/>
+        </p:nvSpPr>
+        <p:spPr>
+          <a:xfrm>
+            <a:off x="144000" y="3885840"/>
+            <a:ext cx="504000" cy="232200"/>
+          </a:xfrm>
+          <a:prstGeom prst="rect">
+            <a:avLst/>
+          </a:prstGeom>
+          <a:noFill/>
+          <a:ln>
+            <a:noFill/>
+          </a:ln>
+        </p:spPr>
+        <p:txBody>
+          <a:bodyPr lIns="90000" rIns="90000" tIns="45000" bIns="45000">
+            <a:noAutofit/>
+          </a:bodyPr>
+          <a:p>
+            <a:r>
+              <a:rPr b="0" lang="en-GB" sz="1000" spc="-1" strike="noStrike">
+                <a:latin typeface="Arial"/>
+              </a:rPr>
+              <a:t>0.1</a:t>
+            </a:r>
+            <a:endParaRPr b="0" lang="en-GB" sz="1000" spc="-1" strike="noStrike">
+              <a:latin typeface="Arial"/>
+            </a:endParaRPr>
+          </a:p>
+        </p:txBody>
+      </p:sp>
+      <p:sp>
+        <p:nvSpPr>
+          <p:cNvPr id="51" name="TextShape 12"/>
+          <p:cNvSpPr txBox="1"/>
+          <p:nvPr/>
+        </p:nvSpPr>
+        <p:spPr>
+          <a:xfrm>
+            <a:off x="144000" y="3093840"/>
+            <a:ext cx="504000" cy="232200"/>
+          </a:xfrm>
+          <a:prstGeom prst="rect">
+            <a:avLst/>
+          </a:prstGeom>
+          <a:noFill/>
+          <a:ln>
+            <a:noFill/>
+          </a:ln>
+        </p:spPr>
+        <p:txBody>
+          <a:bodyPr lIns="90000" rIns="90000" tIns="45000" bIns="45000">
+            <a:noAutofit/>
+          </a:bodyPr>
+          <a:p>
+            <a:r>
+              <a:rPr b="0" lang="en-GB" sz="1000" spc="-1" strike="noStrike">
+                <a:latin typeface="Arial"/>
+              </a:rPr>
+              <a:t>0.2</a:t>
+            </a:r>
+            <a:endParaRPr b="0" lang="en-GB" sz="1000" spc="-1" strike="noStrike">
+              <a:latin typeface="Arial"/>
+            </a:endParaRPr>
+          </a:p>
+        </p:txBody>
+      </p:sp>
+      <p:sp>
+        <p:nvSpPr>
+          <p:cNvPr id="52" name="TextShape 13"/>
+          <p:cNvSpPr txBox="1"/>
+          <p:nvPr/>
+        </p:nvSpPr>
+        <p:spPr>
+          <a:xfrm>
+            <a:off x="144000" y="2301840"/>
+            <a:ext cx="504000" cy="232200"/>
+          </a:xfrm>
+          <a:prstGeom prst="rect">
+            <a:avLst/>
+          </a:prstGeom>
+          <a:noFill/>
+          <a:ln>
+            <a:noFill/>
+          </a:ln>
+        </p:spPr>
+        <p:txBody>
+          <a:bodyPr lIns="90000" rIns="90000" tIns="45000" bIns="45000">
+            <a:noAutofit/>
+          </a:bodyPr>
+          <a:p>
+            <a:r>
+              <a:rPr b="0" lang="en-GB" sz="1000" spc="-1" strike="noStrike">
+                <a:latin typeface="Arial"/>
+              </a:rPr>
+              <a:t>0.3</a:t>
+            </a:r>
+            <a:endParaRPr b="0" lang="en-GB" sz="1000" spc="-1" strike="noStrike">
+              <a:latin typeface="Arial"/>
+            </a:endParaRPr>
+          </a:p>
+        </p:txBody>
+      </p:sp>
+      <p:sp>
+        <p:nvSpPr>
+          <p:cNvPr id="53" name="TextShape 14"/>
+          <p:cNvSpPr txBox="1"/>
+          <p:nvPr/>
+        </p:nvSpPr>
+        <p:spPr>
+          <a:xfrm>
+            <a:off x="144000" y="1509840"/>
+            <a:ext cx="504000" cy="232200"/>
+          </a:xfrm>
+          <a:prstGeom prst="rect">
+            <a:avLst/>
+          </a:prstGeom>
+          <a:noFill/>
+          <a:ln>
+            <a:noFill/>
+          </a:ln>
+        </p:spPr>
+        <p:txBody>
+          <a:bodyPr lIns="90000" rIns="90000" tIns="45000" bIns="45000">
+            <a:noAutofit/>
+          </a:bodyPr>
+          <a:p>
+            <a:r>
+              <a:rPr b="0" lang="en-GB" sz="1000" spc="-1" strike="noStrike">
+                <a:latin typeface="Arial"/>
+              </a:rPr>
+              <a:t>0.4</a:t>
+            </a:r>
+            <a:endParaRPr b="0" lang="en-GB" sz="1000" spc="-1" strike="noStrike">
+              <a:latin typeface="Arial"/>
+            </a:endParaRPr>
+          </a:p>
+        </p:txBody>
+      </p:sp>
+      <p:sp>
+        <p:nvSpPr>
+          <p:cNvPr id="54" name="TextShape 15"/>
+          <p:cNvSpPr txBox="1"/>
+          <p:nvPr/>
+        </p:nvSpPr>
+        <p:spPr>
+          <a:xfrm>
+            <a:off x="360000" y="609840"/>
+            <a:ext cx="1296000" cy="889560"/>
+          </a:xfrm>
+          <a:prstGeom prst="rect">
+            <a:avLst/>
+          </a:prstGeom>
+          <a:noFill/>
+          <a:ln>
+            <a:noFill/>
+          </a:ln>
+        </p:spPr>
+        <p:txBody>
+          <a:bodyPr lIns="90000" rIns="90000" tIns="45000" bIns="45000">
+            <a:noAutofit/>
+          </a:bodyPr>
+          <a:p>
+            <a:r>
+              <a:rPr b="0" lang="en-GB" sz="1000" spc="-1" strike="noStrike">
+                <a:latin typeface="Arial"/>
+              </a:rPr>
+              <a:t>MAC (m</a:t>
+            </a:r>
+            <a:r>
+              <a:rPr b="0" lang="en-GB" sz="1000" spc="-1" strike="noStrike" baseline="33000">
+                <a:latin typeface="Arial"/>
+              </a:rPr>
+              <a:t>2</a:t>
+            </a:r>
+            <a:r>
+              <a:rPr b="0" lang="en-GB" sz="1000" spc="-1" strike="noStrike">
+                <a:latin typeface="Arial"/>
+              </a:rPr>
+              <a:t>/mg)</a:t>
+            </a:r>
+            <a:endParaRPr b="0" lang="en-GB" sz="1000" spc="-1" strike="noStrike">
+              <a:latin typeface="Arial"/>
+            </a:endParaRPr>
+          </a:p>
+        </p:txBody>
+      </p:sp>
+      <p:sp>
+        <p:nvSpPr>
+          <p:cNvPr id="55" name="TextShape 16"/>
+          <p:cNvSpPr txBox="1"/>
+          <p:nvPr/>
+        </p:nvSpPr>
+        <p:spPr>
+          <a:xfrm>
+            <a:off x="6120000" y="4981680"/>
+            <a:ext cx="504000" cy="232200"/>
+          </a:xfrm>
+          <a:prstGeom prst="rect">
+            <a:avLst/>
+          </a:prstGeom>
+          <a:noFill/>
+          <a:ln>
+            <a:noFill/>
+          </a:ln>
+        </p:spPr>
+        <p:txBody>
+          <a:bodyPr lIns="90000" rIns="90000" tIns="45000" bIns="45000">
+            <a:noAutofit/>
+          </a:bodyPr>
+          <a:p>
+            <a:r>
+              <a:rPr b="0" lang="en-GB" sz="1000" spc="-1" strike="noStrike">
+                <a:latin typeface="Arial"/>
+              </a:rPr>
+              <a:t>HA</a:t>
+            </a:r>
+            <a:endParaRPr b="0" lang="en-GB" sz="1000" spc="-1" strike="noStrike">
+              <a:latin typeface="Arial"/>
+            </a:endParaRPr>
+          </a:p>
+        </p:txBody>
+      </p:sp>
+      <p:sp>
+        <p:nvSpPr>
+          <p:cNvPr id="56" name="TextShape 17"/>
+          <p:cNvSpPr txBox="1"/>
+          <p:nvPr/>
+        </p:nvSpPr>
+        <p:spPr>
+          <a:xfrm>
+            <a:off x="7164000" y="4981680"/>
+            <a:ext cx="504000" cy="232200"/>
+          </a:xfrm>
+          <a:prstGeom prst="rect">
+            <a:avLst/>
+          </a:prstGeom>
+          <a:noFill/>
+          <a:ln>
+            <a:noFill/>
+          </a:ln>
+        </p:spPr>
+        <p:txBody>
+          <a:bodyPr lIns="90000" rIns="90000" tIns="45000" bIns="45000">
+            <a:noAutofit/>
+          </a:bodyPr>
+          <a:p>
+            <a:r>
+              <a:rPr b="0" lang="en-GB" sz="1000" spc="-1" strike="noStrike">
+                <a:latin typeface="Arial"/>
+              </a:rPr>
+              <a:t>LA</a:t>
+            </a:r>
+            <a:endParaRPr b="0" lang="en-GB" sz="1000" spc="-1" strike="noStrike">
+              <a:latin typeface="Arial"/>
+            </a:endParaRPr>
+          </a:p>
+        </p:txBody>
+      </p:sp>
+      <p:sp>
+        <p:nvSpPr>
+          <p:cNvPr id="57" name="TextShape 18"/>
+          <p:cNvSpPr txBox="1"/>
+          <p:nvPr/>
+        </p:nvSpPr>
+        <p:spPr>
+          <a:xfrm>
+            <a:off x="8244000" y="4981680"/>
+            <a:ext cx="504000" cy="232200"/>
+          </a:xfrm>
+          <a:prstGeom prst="rect">
+            <a:avLst/>
+          </a:prstGeom>
+          <a:noFill/>
+          <a:ln>
+            <a:noFill/>
+          </a:ln>
+        </p:spPr>
+        <p:txBody>
+          <a:bodyPr lIns="90000" rIns="90000" tIns="45000" bIns="45000">
+            <a:noAutofit/>
+          </a:bodyPr>
+          <a:p>
+            <a:r>
+              <a:rPr b="0" lang="en-GB" sz="1000" spc="-1" strike="noStrike">
+                <a:latin typeface="Arial"/>
+              </a:rPr>
+              <a:t>CI</a:t>
+            </a:r>
+            <a:endParaRPr b="0" lang="en-GB" sz="1000" spc="-1" strike="noStrike">
+              <a:latin typeface="Arial"/>
+            </a:endParaRPr>
+          </a:p>
+        </p:txBody>
+      </p:sp>
+      <p:sp>
+        <p:nvSpPr>
+          <p:cNvPr id="58" name="TextShape 19"/>
+          <p:cNvSpPr txBox="1"/>
+          <p:nvPr/>
+        </p:nvSpPr>
+        <p:spPr>
+          <a:xfrm>
+            <a:off x="9288000" y="4981680"/>
+            <a:ext cx="504000" cy="232200"/>
+          </a:xfrm>
+          <a:prstGeom prst="rect">
+            <a:avLst/>
+          </a:prstGeom>
+          <a:noFill/>
+          <a:ln>
+            <a:noFill/>
+          </a:ln>
+        </p:spPr>
+        <p:txBody>
+          <a:bodyPr lIns="90000" rIns="90000" tIns="45000" bIns="45000">
+            <a:noAutofit/>
+          </a:bodyPr>
+          <a:p>
+            <a:r>
+              <a:rPr b="0" lang="en-GB" sz="1000" spc="-1" strike="noStrike">
+                <a:latin typeface="Arial"/>
+              </a:rPr>
+              <a:t>SN</a:t>
+            </a:r>
+            <a:endParaRPr b="0" lang="en-GB" sz="1000" spc="-1" strike="noStrike">
+              <a:latin typeface="Arial"/>
+            </a:endParaRPr>
+          </a:p>
+        </p:txBody>
+      </p:sp>
+      <p:sp>
+        <p:nvSpPr>
+          <p:cNvPr id="59" name="TextShape 20"/>
+          <p:cNvSpPr txBox="1"/>
+          <p:nvPr/>
+        </p:nvSpPr>
+        <p:spPr>
+          <a:xfrm>
+            <a:off x="6876000" y="5233680"/>
+            <a:ext cx="2808000" cy="489960"/>
+          </a:xfrm>
+          <a:prstGeom prst="rect">
+            <a:avLst/>
+          </a:prstGeom>
+          <a:noFill/>
+          <a:ln>
+            <a:noFill/>
+          </a:ln>
+        </p:spPr>
+        <p:txBody>
+          <a:bodyPr lIns="90000" rIns="90000" tIns="45000" bIns="45000">
+            <a:noAutofit/>
+          </a:bodyPr>
+          <a:p>
+            <a:r>
+              <a:rPr b="0" lang="en-GB" sz="1000" spc="-1" strike="noStrike">
+                <a:latin typeface="Arial"/>
+              </a:rPr>
+              <a:t>Surface class from field notes</a:t>
+            </a:r>
+            <a:endParaRPr b="0" lang="en-GB" sz="1000" spc="-1" strike="noStrike">
+              <a:latin typeface="Arial"/>
+            </a:endParaRPr>
+          </a:p>
+        </p:txBody>
+      </p:sp>
+      <p:sp>
+        <p:nvSpPr>
+          <p:cNvPr id="60" name="TextShape 21"/>
+          <p:cNvSpPr txBox="1"/>
+          <p:nvPr/>
+        </p:nvSpPr>
+        <p:spPr>
+          <a:xfrm>
+            <a:off x="5580000" y="4821840"/>
+            <a:ext cx="504000" cy="232200"/>
+          </a:xfrm>
+          <a:prstGeom prst="rect">
+            <a:avLst/>
+          </a:prstGeom>
+          <a:noFill/>
+          <a:ln>
+            <a:noFill/>
+          </a:ln>
+        </p:spPr>
+        <p:txBody>
+          <a:bodyPr lIns="90000" rIns="90000" tIns="45000" bIns="45000">
+            <a:noAutofit/>
+          </a:bodyPr>
+          <a:p>
+            <a:r>
+              <a:rPr b="0" lang="en-GB" sz="1000" spc="-1" strike="noStrike">
+                <a:latin typeface="Arial"/>
+              </a:rPr>
+              <a:t>0</a:t>
+            </a:r>
+            <a:endParaRPr b="0" lang="en-GB" sz="1000" spc="-1" strike="noStrike">
+              <a:latin typeface="Arial"/>
+            </a:endParaRPr>
+          </a:p>
+        </p:txBody>
+      </p:sp>
+      <p:sp>
+        <p:nvSpPr>
+          <p:cNvPr id="61" name="TextShape 22"/>
+          <p:cNvSpPr txBox="1"/>
+          <p:nvPr/>
+        </p:nvSpPr>
+        <p:spPr>
+          <a:xfrm>
+            <a:off x="5328000" y="4356000"/>
+            <a:ext cx="792000" cy="232200"/>
+          </a:xfrm>
+          <a:prstGeom prst="rect">
+            <a:avLst/>
+          </a:prstGeom>
+          <a:noFill/>
+          <a:ln>
+            <a:noFill/>
+          </a:ln>
+        </p:spPr>
+        <p:txBody>
+          <a:bodyPr lIns="90000" rIns="90000" tIns="45000" bIns="45000">
+            <a:noAutofit/>
+          </a:bodyPr>
+          <a:p>
+            <a:r>
+              <a:rPr b="0" lang="en-GB" sz="1000" spc="-1" strike="noStrike">
+                <a:latin typeface="Arial"/>
+              </a:rPr>
+              <a:t>20000</a:t>
+            </a:r>
+            <a:endParaRPr b="0" lang="en-GB" sz="1000" spc="-1" strike="noStrike">
+              <a:latin typeface="Arial"/>
+            </a:endParaRPr>
+          </a:p>
+        </p:txBody>
+      </p:sp>
+      <p:sp>
+        <p:nvSpPr>
+          <p:cNvPr id="62" name="TextShape 23"/>
+          <p:cNvSpPr txBox="1"/>
+          <p:nvPr/>
+        </p:nvSpPr>
+        <p:spPr>
+          <a:xfrm>
+            <a:off x="5328000" y="4104000"/>
+            <a:ext cx="792000" cy="232200"/>
+          </a:xfrm>
+          <a:prstGeom prst="rect">
+            <a:avLst/>
+          </a:prstGeom>
+          <a:noFill/>
+          <a:ln>
+            <a:noFill/>
+          </a:ln>
+        </p:spPr>
+        <p:txBody>
+          <a:bodyPr lIns="90000" rIns="90000" tIns="45000" bIns="45000">
+            <a:noAutofit/>
+          </a:bodyPr>
+          <a:p>
+            <a:r>
+              <a:rPr b="0" lang="en-GB" sz="1000" spc="-1" strike="noStrike">
+                <a:latin typeface="Arial"/>
+              </a:rPr>
+              <a:t>30000</a:t>
+            </a:r>
+            <a:endParaRPr b="0" lang="en-GB" sz="1000" spc="-1" strike="noStrike">
+              <a:latin typeface="Arial"/>
+            </a:endParaRPr>
+          </a:p>
+        </p:txBody>
+      </p:sp>
+      <p:sp>
+        <p:nvSpPr>
+          <p:cNvPr id="63" name="TextShape 24"/>
+          <p:cNvSpPr txBox="1"/>
+          <p:nvPr/>
+        </p:nvSpPr>
+        <p:spPr>
+          <a:xfrm>
+            <a:off x="5328000" y="3852000"/>
+            <a:ext cx="792000" cy="232200"/>
+          </a:xfrm>
+          <a:prstGeom prst="rect">
+            <a:avLst/>
+          </a:prstGeom>
+          <a:noFill/>
+          <a:ln>
+            <a:noFill/>
+          </a:ln>
+        </p:spPr>
+        <p:txBody>
+          <a:bodyPr lIns="90000" rIns="90000" tIns="45000" bIns="45000">
+            <a:noAutofit/>
+          </a:bodyPr>
+          <a:p>
+            <a:r>
+              <a:rPr b="0" lang="en-GB" sz="1000" spc="-1" strike="noStrike">
+                <a:latin typeface="Arial"/>
+              </a:rPr>
+              <a:t>40000</a:t>
+            </a:r>
+            <a:endParaRPr b="0" lang="en-GB" sz="1000" spc="-1" strike="noStrike">
+              <a:latin typeface="Arial"/>
+            </a:endParaRPr>
+          </a:p>
+        </p:txBody>
+      </p:sp>
+      <p:sp>
+        <p:nvSpPr>
+          <p:cNvPr id="64" name="TextShape 25"/>
+          <p:cNvSpPr txBox="1"/>
+          <p:nvPr/>
+        </p:nvSpPr>
+        <p:spPr>
+          <a:xfrm>
+            <a:off x="5328000" y="4608000"/>
+            <a:ext cx="792000" cy="232200"/>
+          </a:xfrm>
+          <a:prstGeom prst="rect">
+            <a:avLst/>
+          </a:prstGeom>
+          <a:noFill/>
+          <a:ln>
+            <a:noFill/>
+          </a:ln>
+        </p:spPr>
+        <p:txBody>
+          <a:bodyPr lIns="90000" rIns="90000" tIns="45000" bIns="45000">
+            <a:noAutofit/>
+          </a:bodyPr>
+          <a:p>
+            <a:r>
+              <a:rPr b="0" lang="en-GB" sz="1000" spc="-1" strike="noStrike">
+                <a:latin typeface="Arial"/>
+              </a:rPr>
+              <a:t>10000</a:t>
+            </a:r>
+            <a:endParaRPr b="0" lang="en-GB" sz="1000" spc="-1" strike="noStrike">
+              <a:latin typeface="Arial"/>
+            </a:endParaRPr>
+          </a:p>
+        </p:txBody>
+      </p:sp>
+      <p:sp>
+        <p:nvSpPr>
+          <p:cNvPr id="65" name="TextShape 26"/>
+          <p:cNvSpPr txBox="1"/>
+          <p:nvPr/>
+        </p:nvSpPr>
+        <p:spPr>
+          <a:xfrm>
+            <a:off x="5580000" y="3309840"/>
+            <a:ext cx="504000" cy="261000"/>
+          </a:xfrm>
+          <a:prstGeom prst="rect">
+            <a:avLst/>
+          </a:prstGeom>
+          <a:noFill/>
+          <a:ln>
+            <a:noFill/>
+          </a:ln>
+        </p:spPr>
+        <p:txBody>
+          <a:bodyPr lIns="90000" rIns="90000" tIns="45000" bIns="45000">
+            <a:noAutofit/>
+          </a:bodyPr>
+          <a:p>
+            <a:r>
+              <a:rPr b="0" lang="en-GB" sz="1200" spc="-1" strike="noStrike">
+                <a:latin typeface="Arial"/>
+              </a:rPr>
+              <a:t>0</a:t>
+            </a:r>
+            <a:endParaRPr b="0" lang="en-GB" sz="1200" spc="-1" strike="noStrike">
+              <a:latin typeface="Arial"/>
+            </a:endParaRPr>
+          </a:p>
+        </p:txBody>
+      </p:sp>
+      <p:sp>
+        <p:nvSpPr>
+          <p:cNvPr id="66" name="TextShape 27"/>
+          <p:cNvSpPr txBox="1"/>
+          <p:nvPr/>
+        </p:nvSpPr>
+        <p:spPr>
+          <a:xfrm>
+            <a:off x="5328000" y="2916000"/>
+            <a:ext cx="792000" cy="232200"/>
+          </a:xfrm>
+          <a:prstGeom prst="rect">
+            <a:avLst/>
+          </a:prstGeom>
+          <a:noFill/>
+          <a:ln>
+            <a:noFill/>
+          </a:ln>
+        </p:spPr>
+        <p:txBody>
+          <a:bodyPr lIns="90000" rIns="90000" tIns="45000" bIns="45000">
+            <a:noAutofit/>
+          </a:bodyPr>
+          <a:p>
+            <a:r>
+              <a:rPr b="0" lang="en-GB" sz="1000" spc="-1" strike="noStrike">
+                <a:latin typeface="Arial"/>
+              </a:rPr>
+              <a:t>20000</a:t>
+            </a:r>
+            <a:endParaRPr b="0" lang="en-GB" sz="1000" spc="-1" strike="noStrike">
+              <a:latin typeface="Arial"/>
+            </a:endParaRPr>
+          </a:p>
+        </p:txBody>
+      </p:sp>
+      <p:sp>
+        <p:nvSpPr>
+          <p:cNvPr id="67" name="TextShape 28"/>
+          <p:cNvSpPr txBox="1"/>
+          <p:nvPr/>
+        </p:nvSpPr>
+        <p:spPr>
+          <a:xfrm>
+            <a:off x="5328000" y="2664000"/>
+            <a:ext cx="792000" cy="232200"/>
+          </a:xfrm>
+          <a:prstGeom prst="rect">
+            <a:avLst/>
+          </a:prstGeom>
+          <a:noFill/>
+          <a:ln>
+            <a:noFill/>
+          </a:ln>
+        </p:spPr>
+        <p:txBody>
+          <a:bodyPr lIns="90000" rIns="90000" tIns="45000" bIns="45000">
+            <a:noAutofit/>
+          </a:bodyPr>
+          <a:p>
+            <a:r>
+              <a:rPr b="0" lang="en-GB" sz="1000" spc="-1" strike="noStrike">
+                <a:latin typeface="Arial"/>
+              </a:rPr>
+              <a:t>30000</a:t>
+            </a:r>
+            <a:endParaRPr b="0" lang="en-GB" sz="1000" spc="-1" strike="noStrike">
+              <a:latin typeface="Arial"/>
+            </a:endParaRPr>
+          </a:p>
+        </p:txBody>
+      </p:sp>
+      <p:sp>
+        <p:nvSpPr>
+          <p:cNvPr id="68" name="TextShape 29"/>
+          <p:cNvSpPr txBox="1"/>
+          <p:nvPr/>
+        </p:nvSpPr>
+        <p:spPr>
+          <a:xfrm>
+            <a:off x="5328000" y="2412000"/>
+            <a:ext cx="792000" cy="232200"/>
+          </a:xfrm>
+          <a:prstGeom prst="rect">
+            <a:avLst/>
+          </a:prstGeom>
+          <a:noFill/>
+          <a:ln>
+            <a:noFill/>
+          </a:ln>
+        </p:spPr>
+        <p:txBody>
+          <a:bodyPr lIns="90000" rIns="90000" tIns="45000" bIns="45000">
+            <a:noAutofit/>
+          </a:bodyPr>
+          <a:p>
+            <a:r>
+              <a:rPr b="0" lang="en-GB" sz="1000" spc="-1" strike="noStrike">
+                <a:latin typeface="Arial"/>
+              </a:rPr>
+              <a:t>40000</a:t>
+            </a:r>
+            <a:endParaRPr b="0" lang="en-GB" sz="1000" spc="-1" strike="noStrike">
+              <a:latin typeface="Arial"/>
+            </a:endParaRPr>
+          </a:p>
+        </p:txBody>
+      </p:sp>
+      <p:sp>
+        <p:nvSpPr>
+          <p:cNvPr id="69" name="TextShape 30"/>
+          <p:cNvSpPr txBox="1"/>
+          <p:nvPr/>
+        </p:nvSpPr>
+        <p:spPr>
+          <a:xfrm>
+            <a:off x="5328000" y="3132000"/>
+            <a:ext cx="792000" cy="232200"/>
+          </a:xfrm>
+          <a:prstGeom prst="rect">
+            <a:avLst/>
+          </a:prstGeom>
+          <a:noFill/>
+          <a:ln>
+            <a:noFill/>
+          </a:ln>
+        </p:spPr>
+        <p:txBody>
+          <a:bodyPr lIns="90000" rIns="90000" tIns="45000" bIns="45000">
+            <a:noAutofit/>
+          </a:bodyPr>
+          <a:p>
+            <a:r>
+              <a:rPr b="0" lang="en-GB" sz="1000" spc="-1" strike="noStrike">
+                <a:latin typeface="Arial"/>
+              </a:rPr>
+              <a:t>10000</a:t>
+            </a:r>
+            <a:endParaRPr b="0" lang="en-GB" sz="1000" spc="-1" strike="noStrike">
+              <a:latin typeface="Arial"/>
+            </a:endParaRPr>
+          </a:p>
+        </p:txBody>
+      </p:sp>
+      <p:sp>
+        <p:nvSpPr>
+          <p:cNvPr id="70" name="TextShape 31"/>
+          <p:cNvSpPr txBox="1"/>
+          <p:nvPr/>
+        </p:nvSpPr>
+        <p:spPr>
+          <a:xfrm>
+            <a:off x="5328000" y="2196000"/>
+            <a:ext cx="792000" cy="232200"/>
+          </a:xfrm>
+          <a:prstGeom prst="rect">
+            <a:avLst/>
+          </a:prstGeom>
+          <a:noFill/>
+          <a:ln>
+            <a:noFill/>
+          </a:ln>
+        </p:spPr>
+        <p:txBody>
+          <a:bodyPr lIns="90000" rIns="90000" tIns="45000" bIns="45000">
+            <a:noAutofit/>
+          </a:bodyPr>
+          <a:p>
+            <a:r>
+              <a:rPr b="0" lang="en-GB" sz="1000" spc="-1" strike="noStrike">
+                <a:latin typeface="Arial"/>
+              </a:rPr>
+              <a:t>50000</a:t>
+            </a:r>
+            <a:endParaRPr b="0" lang="en-GB" sz="1000" spc="-1" strike="noStrike">
+              <a:latin typeface="Arial"/>
+            </a:endParaRPr>
+          </a:p>
+        </p:txBody>
+      </p:sp>
+      <p:sp>
+        <p:nvSpPr>
+          <p:cNvPr id="71" name="TextShape 32"/>
+          <p:cNvSpPr txBox="1"/>
+          <p:nvPr/>
+        </p:nvSpPr>
+        <p:spPr>
+          <a:xfrm>
+            <a:off x="5580000" y="1797840"/>
+            <a:ext cx="504000" cy="232200"/>
+          </a:xfrm>
+          <a:prstGeom prst="rect">
+            <a:avLst/>
+          </a:prstGeom>
+          <a:noFill/>
+          <a:ln>
+            <a:noFill/>
+          </a:ln>
+        </p:spPr>
+        <p:txBody>
+          <a:bodyPr lIns="90000" rIns="90000" tIns="45000" bIns="45000">
+            <a:noAutofit/>
+          </a:bodyPr>
+          <a:p>
+            <a:r>
+              <a:rPr b="0" lang="en-GB" sz="1000" spc="-1" strike="noStrike">
+                <a:latin typeface="Arial"/>
+              </a:rPr>
+              <a:t>0</a:t>
+            </a:r>
+            <a:endParaRPr b="0" lang="en-GB" sz="1000" spc="-1" strike="noStrike">
+              <a:latin typeface="Arial"/>
+            </a:endParaRPr>
+          </a:p>
+        </p:txBody>
+      </p:sp>
+      <p:sp>
+        <p:nvSpPr>
+          <p:cNvPr id="72" name="TextShape 33"/>
+          <p:cNvSpPr txBox="1"/>
+          <p:nvPr/>
+        </p:nvSpPr>
+        <p:spPr>
+          <a:xfrm>
+            <a:off x="5328000" y="1404000"/>
+            <a:ext cx="792000" cy="232200"/>
+          </a:xfrm>
+          <a:prstGeom prst="rect">
+            <a:avLst/>
+          </a:prstGeom>
+          <a:noFill/>
+          <a:ln>
+            <a:noFill/>
+          </a:ln>
+        </p:spPr>
+        <p:txBody>
+          <a:bodyPr lIns="90000" rIns="90000" tIns="45000" bIns="45000">
+            <a:noAutofit/>
+          </a:bodyPr>
+          <a:p>
+            <a:r>
+              <a:rPr b="0" lang="en-GB" sz="1000" spc="-1" strike="noStrike">
+                <a:latin typeface="Arial"/>
+              </a:rPr>
+              <a:t>20000</a:t>
+            </a:r>
+            <a:endParaRPr b="0" lang="en-GB" sz="1000" spc="-1" strike="noStrike">
+              <a:latin typeface="Arial"/>
+            </a:endParaRPr>
+          </a:p>
+        </p:txBody>
+      </p:sp>
+      <p:sp>
+        <p:nvSpPr>
+          <p:cNvPr id="73" name="TextShape 34"/>
+          <p:cNvSpPr txBox="1"/>
+          <p:nvPr/>
+        </p:nvSpPr>
+        <p:spPr>
+          <a:xfrm>
+            <a:off x="5328000" y="1152000"/>
+            <a:ext cx="792000" cy="232200"/>
+          </a:xfrm>
+          <a:prstGeom prst="rect">
+            <a:avLst/>
+          </a:prstGeom>
+          <a:noFill/>
+          <a:ln>
+            <a:noFill/>
+          </a:ln>
+        </p:spPr>
+        <p:txBody>
+          <a:bodyPr lIns="90000" rIns="90000" tIns="45000" bIns="45000">
+            <a:noAutofit/>
+          </a:bodyPr>
+          <a:p>
+            <a:r>
+              <a:rPr b="0" lang="en-GB" sz="1000" spc="-1" strike="noStrike">
+                <a:latin typeface="Arial"/>
+              </a:rPr>
+              <a:t>30000</a:t>
+            </a:r>
+            <a:endParaRPr b="0" lang="en-GB" sz="1000" spc="-1" strike="noStrike">
+              <a:latin typeface="Arial"/>
+            </a:endParaRPr>
+          </a:p>
+        </p:txBody>
+      </p:sp>
+      <p:sp>
+        <p:nvSpPr>
+          <p:cNvPr id="74" name="TextShape 35"/>
+          <p:cNvSpPr txBox="1"/>
+          <p:nvPr/>
+        </p:nvSpPr>
+        <p:spPr>
+          <a:xfrm>
+            <a:off x="5328000" y="900000"/>
+            <a:ext cx="792000" cy="232200"/>
+          </a:xfrm>
+          <a:prstGeom prst="rect">
+            <a:avLst/>
+          </a:prstGeom>
+          <a:noFill/>
+          <a:ln>
+            <a:noFill/>
+          </a:ln>
+        </p:spPr>
+        <p:txBody>
+          <a:bodyPr lIns="90000" rIns="90000" tIns="45000" bIns="45000">
+            <a:noAutofit/>
+          </a:bodyPr>
+          <a:p>
+            <a:r>
+              <a:rPr b="0" lang="en-GB" sz="1000" spc="-1" strike="noStrike">
+                <a:latin typeface="Arial"/>
+              </a:rPr>
+              <a:t>40000</a:t>
+            </a:r>
+            <a:endParaRPr b="0" lang="en-GB" sz="1000" spc="-1" strike="noStrike">
+              <a:latin typeface="Arial"/>
+            </a:endParaRPr>
+          </a:p>
+        </p:txBody>
+      </p:sp>
+      <p:sp>
+        <p:nvSpPr>
+          <p:cNvPr id="75" name="TextShape 36"/>
+          <p:cNvSpPr txBox="1"/>
+          <p:nvPr/>
+        </p:nvSpPr>
+        <p:spPr>
+          <a:xfrm>
+            <a:off x="5328000" y="1620000"/>
+            <a:ext cx="792000" cy="232200"/>
+          </a:xfrm>
+          <a:prstGeom prst="rect">
+            <a:avLst/>
+          </a:prstGeom>
+          <a:noFill/>
+          <a:ln>
+            <a:noFill/>
+          </a:ln>
+        </p:spPr>
+        <p:txBody>
+          <a:bodyPr lIns="90000" rIns="90000" tIns="45000" bIns="45000">
+            <a:noAutofit/>
+          </a:bodyPr>
+          <a:p>
+            <a:r>
+              <a:rPr b="0" lang="en-GB" sz="1000" spc="-1" strike="noStrike">
+                <a:latin typeface="Arial"/>
+              </a:rPr>
+              <a:t>10000</a:t>
+            </a:r>
+            <a:endParaRPr b="0" lang="en-GB" sz="1000" spc="-1" strike="noStrike">
+              <a:latin typeface="Arial"/>
+            </a:endParaRPr>
+          </a:p>
+        </p:txBody>
+      </p:sp>
+      <p:sp>
+        <p:nvSpPr>
+          <p:cNvPr id="76" name="TextShape 37"/>
+          <p:cNvSpPr txBox="1"/>
+          <p:nvPr/>
+        </p:nvSpPr>
+        <p:spPr>
+          <a:xfrm>
+            <a:off x="5328000" y="684000"/>
+            <a:ext cx="792000" cy="232200"/>
+          </a:xfrm>
+          <a:prstGeom prst="rect">
+            <a:avLst/>
+          </a:prstGeom>
+          <a:noFill/>
+          <a:ln>
+            <a:noFill/>
+          </a:ln>
+        </p:spPr>
+        <p:txBody>
+          <a:bodyPr lIns="90000" rIns="90000" tIns="45000" bIns="45000">
+            <a:noAutofit/>
+          </a:bodyPr>
+          <a:p>
+            <a:r>
+              <a:rPr b="0" lang="en-GB" sz="1000" spc="-1" strike="noStrike">
+                <a:latin typeface="Arial"/>
+              </a:rPr>
+              <a:t>50000</a:t>
+            </a:r>
+            <a:endParaRPr b="0" lang="en-GB" sz="1000" spc="-1" strike="noStrike">
+              <a:latin typeface="Arial"/>
+            </a:endParaRPr>
+          </a:p>
+        </p:txBody>
+      </p:sp>
+      <p:sp>
+        <p:nvSpPr>
+          <p:cNvPr id="77" name="TextShape 38"/>
+          <p:cNvSpPr txBox="1"/>
+          <p:nvPr/>
+        </p:nvSpPr>
+        <p:spPr>
+          <a:xfrm>
+            <a:off x="6415200" y="3600000"/>
+            <a:ext cx="3672000" cy="489960"/>
+          </a:xfrm>
+          <a:prstGeom prst="rect">
+            <a:avLst/>
+          </a:prstGeom>
+          <a:noFill/>
+          <a:ln>
+            <a:noFill/>
+          </a:ln>
+        </p:spPr>
+        <p:txBody>
+          <a:bodyPr lIns="90000" rIns="90000" tIns="45000" bIns="45000">
+            <a:noAutofit/>
+          </a:bodyPr>
+          <a:p>
+            <a:r>
+              <a:rPr b="0" lang="en-GB" sz="1000" spc="-1" strike="noStrike">
+                <a:latin typeface="Arial"/>
+              </a:rPr>
+              <a:t>Algal concentration predicted by model (cells/mL) </a:t>
+            </a:r>
+            <a:endParaRPr b="0" lang="en-GB" sz="1000" spc="-1" strike="noStrike">
+              <a:latin typeface="Arial"/>
+            </a:endParaRPr>
+          </a:p>
+        </p:txBody>
+      </p:sp>
+      <p:sp>
+        <p:nvSpPr>
+          <p:cNvPr id="78" name="TextShape 39"/>
+          <p:cNvSpPr txBox="1"/>
+          <p:nvPr/>
+        </p:nvSpPr>
+        <p:spPr>
+          <a:xfrm>
+            <a:off x="5904000" y="3439800"/>
+            <a:ext cx="216000" cy="232200"/>
+          </a:xfrm>
+          <a:prstGeom prst="rect">
+            <a:avLst/>
+          </a:prstGeom>
+          <a:noFill/>
+          <a:ln>
+            <a:noFill/>
+          </a:ln>
+        </p:spPr>
+        <p:txBody>
+          <a:bodyPr lIns="90000" rIns="90000" tIns="45000" bIns="45000">
+            <a:noAutofit/>
+          </a:bodyPr>
+          <a:p>
+            <a:r>
+              <a:rPr b="0" lang="en-GB" sz="1000" spc="-1" strike="noStrike">
+                <a:latin typeface="Arial"/>
+              </a:rPr>
+              <a:t>0</a:t>
+            </a:r>
+            <a:endParaRPr b="0" lang="en-GB" sz="1000" spc="-1" strike="noStrike">
+              <a:latin typeface="Arial"/>
+            </a:endParaRPr>
+          </a:p>
+        </p:txBody>
+      </p:sp>
+      <p:sp>
+        <p:nvSpPr>
+          <p:cNvPr id="79" name="TextShape 40"/>
+          <p:cNvSpPr txBox="1"/>
+          <p:nvPr/>
+        </p:nvSpPr>
+        <p:spPr>
+          <a:xfrm>
+            <a:off x="6408000" y="3440160"/>
+            <a:ext cx="504000" cy="232200"/>
+          </a:xfrm>
+          <a:prstGeom prst="rect">
+            <a:avLst/>
+          </a:prstGeom>
+          <a:noFill/>
+          <a:ln>
+            <a:noFill/>
+          </a:ln>
+        </p:spPr>
+        <p:txBody>
+          <a:bodyPr lIns="90000" rIns="90000" tIns="45000" bIns="45000">
+            <a:noAutofit/>
+          </a:bodyPr>
+          <a:p>
+            <a:r>
+              <a:rPr b="0" lang="en-GB" sz="1000" spc="-1" strike="noStrike">
+                <a:latin typeface="Arial"/>
+              </a:rPr>
+              <a:t>5000</a:t>
+            </a:r>
+            <a:endParaRPr b="0" lang="en-GB" sz="1000" spc="-1" strike="noStrike">
+              <a:latin typeface="Arial"/>
+            </a:endParaRPr>
+          </a:p>
+        </p:txBody>
+      </p:sp>
+      <p:sp>
+        <p:nvSpPr>
+          <p:cNvPr id="80" name="TextShape 41"/>
+          <p:cNvSpPr txBox="1"/>
+          <p:nvPr/>
+        </p:nvSpPr>
+        <p:spPr>
+          <a:xfrm>
+            <a:off x="6984000" y="3440520"/>
+            <a:ext cx="576000" cy="232200"/>
+          </a:xfrm>
+          <a:prstGeom prst="rect">
+            <a:avLst/>
+          </a:prstGeom>
+          <a:noFill/>
+          <a:ln>
+            <a:noFill/>
+          </a:ln>
+        </p:spPr>
+        <p:txBody>
+          <a:bodyPr lIns="90000" rIns="90000" tIns="45000" bIns="45000">
+            <a:noAutofit/>
+          </a:bodyPr>
+          <a:p>
+            <a:r>
+              <a:rPr b="0" lang="en-GB" sz="1000" spc="-1" strike="noStrike">
+                <a:latin typeface="Arial"/>
+              </a:rPr>
+              <a:t>10000</a:t>
+            </a:r>
+            <a:endParaRPr b="0" lang="en-GB" sz="1000" spc="-1" strike="noStrike">
+              <a:latin typeface="Arial"/>
+            </a:endParaRPr>
+          </a:p>
+        </p:txBody>
+      </p:sp>
+      <p:sp>
+        <p:nvSpPr>
+          <p:cNvPr id="81" name="TextShape 42"/>
+          <p:cNvSpPr txBox="1"/>
+          <p:nvPr/>
+        </p:nvSpPr>
+        <p:spPr>
+          <a:xfrm>
+            <a:off x="7668000" y="3440880"/>
+            <a:ext cx="576000" cy="232200"/>
+          </a:xfrm>
+          <a:prstGeom prst="rect">
+            <a:avLst/>
+          </a:prstGeom>
+          <a:noFill/>
+          <a:ln>
+            <a:noFill/>
+          </a:ln>
+        </p:spPr>
+        <p:txBody>
+          <a:bodyPr lIns="90000" rIns="90000" tIns="45000" bIns="45000">
+            <a:noAutofit/>
+          </a:bodyPr>
+          <a:p>
+            <a:r>
+              <a:rPr b="0" lang="en-GB" sz="1000" spc="-1" strike="noStrike">
+                <a:latin typeface="Arial"/>
+              </a:rPr>
+              <a:t>15000</a:t>
+            </a:r>
+            <a:endParaRPr b="0" lang="en-GB" sz="1000" spc="-1" strike="noStrike">
+              <a:latin typeface="Arial"/>
+            </a:endParaRPr>
+          </a:p>
+        </p:txBody>
+      </p:sp>
+      <p:sp>
+        <p:nvSpPr>
+          <p:cNvPr id="82" name="TextShape 43"/>
+          <p:cNvSpPr txBox="1"/>
+          <p:nvPr/>
+        </p:nvSpPr>
+        <p:spPr>
+          <a:xfrm>
+            <a:off x="8280000" y="3441240"/>
+            <a:ext cx="576000" cy="232200"/>
+          </a:xfrm>
+          <a:prstGeom prst="rect">
+            <a:avLst/>
+          </a:prstGeom>
+          <a:noFill/>
+          <a:ln>
+            <a:noFill/>
+          </a:ln>
+        </p:spPr>
+        <p:txBody>
+          <a:bodyPr lIns="90000" rIns="90000" tIns="45000" bIns="45000">
+            <a:noAutofit/>
+          </a:bodyPr>
+          <a:p>
+            <a:r>
+              <a:rPr b="0" lang="en-GB" sz="1000" spc="-1" strike="noStrike">
+                <a:latin typeface="Arial"/>
+              </a:rPr>
+              <a:t>20000</a:t>
+            </a:r>
+            <a:endParaRPr b="0" lang="en-GB" sz="1000" spc="-1" strike="noStrike">
+              <a:latin typeface="Arial"/>
+            </a:endParaRPr>
+          </a:p>
+        </p:txBody>
+      </p:sp>
+      <p:sp>
+        <p:nvSpPr>
+          <p:cNvPr id="83" name="TextShape 44"/>
+          <p:cNvSpPr txBox="1"/>
+          <p:nvPr/>
+        </p:nvSpPr>
+        <p:spPr>
+          <a:xfrm>
+            <a:off x="8892000" y="3441600"/>
+            <a:ext cx="576000" cy="232200"/>
+          </a:xfrm>
+          <a:prstGeom prst="rect">
+            <a:avLst/>
+          </a:prstGeom>
+          <a:noFill/>
+          <a:ln>
+            <a:noFill/>
+          </a:ln>
+        </p:spPr>
+        <p:txBody>
+          <a:bodyPr lIns="90000" rIns="90000" tIns="45000" bIns="45000">
+            <a:noAutofit/>
+          </a:bodyPr>
+          <a:p>
+            <a:r>
+              <a:rPr b="0" lang="en-GB" sz="1000" spc="-1" strike="noStrike">
+                <a:latin typeface="Arial"/>
+              </a:rPr>
+              <a:t>25000</a:t>
+            </a:r>
+            <a:endParaRPr b="0" lang="en-GB" sz="1000" spc="-1" strike="noStrike">
+              <a:latin typeface="Arial"/>
+            </a:endParaRPr>
+          </a:p>
+        </p:txBody>
+      </p:sp>
+      <p:sp>
+        <p:nvSpPr>
+          <p:cNvPr id="84" name="TextShape 45"/>
+          <p:cNvSpPr txBox="1"/>
+          <p:nvPr/>
+        </p:nvSpPr>
+        <p:spPr>
+          <a:xfrm>
+            <a:off x="9540000" y="3441960"/>
+            <a:ext cx="576000" cy="232200"/>
+          </a:xfrm>
+          <a:prstGeom prst="rect">
+            <a:avLst/>
+          </a:prstGeom>
+          <a:noFill/>
+          <a:ln>
+            <a:noFill/>
+          </a:ln>
+        </p:spPr>
+        <p:txBody>
+          <a:bodyPr lIns="90000" rIns="90000" tIns="45000" bIns="45000">
+            <a:noAutofit/>
+          </a:bodyPr>
+          <a:p>
+            <a:r>
+              <a:rPr b="0" lang="en-GB" sz="1000" spc="-1" strike="noStrike">
+                <a:latin typeface="Arial"/>
+              </a:rPr>
+              <a:t>30000</a:t>
+            </a:r>
+            <a:endParaRPr b="0" lang="en-GB" sz="1000" spc="-1" strike="noStrike">
+              <a:latin typeface="Arial"/>
+            </a:endParaRPr>
+          </a:p>
+        </p:txBody>
+      </p:sp>
+      <p:sp>
+        <p:nvSpPr>
+          <p:cNvPr id="85" name="CustomShape 46"/>
           <p:cNvSpPr/>
           <p:nvPr/>
         </p:nvSpPr>
         <p:spPr>
           <a:xfrm>
-            <a:off x="5010480" y="3456000"/>
-            <a:ext cx="719640" cy="345960"/>
-          </a:xfrm>
-          <a:prstGeom prst="rect">
-            <a:avLst/>
-          </a:prstGeom>
-          <a:noFill/>
-          <a:ln>
-            <a:noFill/>
+            <a:off x="5796000" y="1980000"/>
+            <a:ext cx="4183200" cy="180000"/>
+          </a:xfrm>
+          <a:prstGeom prst="rect">
+            <a:avLst/>
+          </a:prstGeom>
+          <a:solidFill>
+            <a:srgbClr val="ffffff"/>
+          </a:solidFill>
+          <a:ln>
+            <a:solidFill>
+              <a:srgbClr val="ffffff"/>
+            </a:solidFill>
           </a:ln>
         </p:spPr>
         <p:style>
@@ -1673,6 +3384,209 @@
           <a:effectRef idx="0"/>
           <a:fontRef idx="minor"/>
         </p:style>
+      </p:sp>
+      <p:sp>
+        <p:nvSpPr>
+          <p:cNvPr id="86" name="TextShape 47"/>
+          <p:cNvSpPr txBox="1"/>
+          <p:nvPr/>
+        </p:nvSpPr>
+        <p:spPr>
+          <a:xfrm rot="16200000">
+            <a:off x="4123800" y="2621880"/>
+            <a:ext cx="1944000" cy="515880"/>
+          </a:xfrm>
+          <a:prstGeom prst="rect">
+            <a:avLst/>
+          </a:prstGeom>
+          <a:noFill/>
+          <a:ln>
+            <a:noFill/>
+          </a:ln>
+        </p:spPr>
+        <p:txBody>
+          <a:bodyPr lIns="90000" rIns="90000" tIns="45000" bIns="45000">
+            <a:noAutofit/>
+          </a:bodyPr>
+          <a:p>
+            <a:pPr algn="ctr"/>
+            <a:r>
+              <a:rPr b="0" lang="en-GB" sz="1000" spc="-1" strike="noStrike">
+                <a:latin typeface="Arial"/>
+              </a:rPr>
+              <a:t>Algal concentration </a:t>
+            </a:r>
+            <a:endParaRPr b="0" lang="en-GB" sz="1000" spc="-1" strike="noStrike">
+              <a:latin typeface="Arial"/>
+            </a:endParaRPr>
+          </a:p>
+          <a:p>
+            <a:pPr algn="ctr"/>
+            <a:r>
+              <a:rPr b="0" lang="en-GB" sz="1000" spc="-1" strike="noStrike">
+                <a:latin typeface="Arial"/>
+              </a:rPr>
+              <a:t>measured in field</a:t>
+            </a:r>
+            <a:endParaRPr b="0" lang="en-GB" sz="1000" spc="-1" strike="noStrike">
+              <a:latin typeface="Arial"/>
+            </a:endParaRPr>
+          </a:p>
+          <a:p>
+            <a:pPr algn="ctr"/>
+            <a:r>
+              <a:rPr b="0" lang="en-GB" sz="1000" spc="-1" strike="noStrike">
+                <a:latin typeface="Arial"/>
+              </a:rPr>
+              <a:t> </a:t>
+            </a:r>
+            <a:r>
+              <a:rPr b="0" lang="en-GB" sz="1000" spc="-1" strike="noStrike">
+                <a:latin typeface="Arial"/>
+              </a:rPr>
+              <a:t>(cells/mL) </a:t>
+            </a:r>
+            <a:endParaRPr b="0" lang="en-GB" sz="1000" spc="-1" strike="noStrike">
+              <a:latin typeface="Arial"/>
+            </a:endParaRPr>
+          </a:p>
+        </p:txBody>
+      </p:sp>
+      <p:sp>
+        <p:nvSpPr>
+          <p:cNvPr id="87" name="TextShape 48"/>
+          <p:cNvSpPr txBox="1"/>
+          <p:nvPr/>
+        </p:nvSpPr>
+        <p:spPr>
+          <a:xfrm rot="16200000">
+            <a:off x="4218840" y="3966840"/>
+            <a:ext cx="1944000" cy="705960"/>
+          </a:xfrm>
+          <a:prstGeom prst="rect">
+            <a:avLst/>
+          </a:prstGeom>
+          <a:noFill/>
+          <a:ln>
+            <a:noFill/>
+          </a:ln>
+        </p:spPr>
+        <p:txBody>
+          <a:bodyPr lIns="90000" rIns="90000" tIns="45000" bIns="45000">
+            <a:noAutofit/>
+          </a:bodyPr>
+          <a:p>
+            <a:pPr algn="ctr"/>
+            <a:r>
+              <a:rPr b="0" lang="en-GB" sz="1000" spc="-1" strike="noStrike">
+                <a:latin typeface="Arial"/>
+              </a:rPr>
+              <a:t>Algal concentration </a:t>
+            </a:r>
+            <a:endParaRPr b="0" lang="en-GB" sz="1000" spc="-1" strike="noStrike">
+              <a:latin typeface="Arial"/>
+            </a:endParaRPr>
+          </a:p>
+          <a:p>
+            <a:pPr algn="ctr"/>
+            <a:r>
+              <a:rPr b="0" lang="en-GB" sz="1000" spc="-1" strike="noStrike">
+                <a:latin typeface="Arial"/>
+              </a:rPr>
+              <a:t>Predicted by model</a:t>
+            </a:r>
+            <a:endParaRPr b="0" lang="en-GB" sz="1000" spc="-1" strike="noStrike">
+              <a:latin typeface="Arial"/>
+            </a:endParaRPr>
+          </a:p>
+          <a:p>
+            <a:pPr algn="ctr"/>
+            <a:r>
+              <a:rPr b="0" lang="en-GB" sz="1000" spc="-1" strike="noStrike">
+                <a:latin typeface="Arial"/>
+              </a:rPr>
+              <a:t>(cells/mL)</a:t>
+            </a:r>
+            <a:endParaRPr b="0" lang="en-GB" sz="1000" spc="-1" strike="noStrike">
+              <a:latin typeface="Arial"/>
+            </a:endParaRPr>
+          </a:p>
+        </p:txBody>
+      </p:sp>
+      <p:sp>
+        <p:nvSpPr>
+          <p:cNvPr id="88" name="TextShape 49"/>
+          <p:cNvSpPr txBox="1"/>
+          <p:nvPr/>
+        </p:nvSpPr>
+        <p:spPr>
+          <a:xfrm rot="16200000">
+            <a:off x="4352040" y="1061640"/>
+            <a:ext cx="1533600" cy="417960"/>
+          </a:xfrm>
+          <a:prstGeom prst="rect">
+            <a:avLst/>
+          </a:prstGeom>
+          <a:noFill/>
+          <a:ln>
+            <a:noFill/>
+          </a:ln>
+        </p:spPr>
+        <p:txBody>
+          <a:bodyPr lIns="90000" rIns="90000" tIns="45000" bIns="45000">
+            <a:noAutofit/>
+          </a:bodyPr>
+          <a:p>
+            <a:pPr algn="ctr"/>
+            <a:r>
+              <a:rPr b="0" lang="en-GB" sz="1000" spc="-1" strike="noStrike">
+                <a:latin typeface="Arial"/>
+              </a:rPr>
+              <a:t>Algal concentration </a:t>
+            </a:r>
+            <a:endParaRPr b="0" lang="en-GB" sz="1000" spc="-1" strike="noStrike">
+              <a:latin typeface="Arial"/>
+            </a:endParaRPr>
+          </a:p>
+          <a:p>
+            <a:pPr algn="ctr"/>
+            <a:r>
+              <a:rPr b="0" lang="en-GB" sz="1000" spc="-1" strike="noStrike">
+                <a:latin typeface="Arial"/>
+              </a:rPr>
+              <a:t>(cells/mL)</a:t>
+            </a:r>
+            <a:endParaRPr b="0" lang="en-GB" sz="1000" spc="-1" strike="noStrike">
+              <a:latin typeface="Arial"/>
+            </a:endParaRPr>
+          </a:p>
+        </p:txBody>
+      </p:sp>
+      <p:sp>
+        <p:nvSpPr>
+          <p:cNvPr id="89" name="CustomShape 50"/>
+          <p:cNvSpPr/>
+          <p:nvPr/>
+        </p:nvSpPr>
+        <p:spPr>
+          <a:xfrm>
+            <a:off x="5832000" y="2298600"/>
+            <a:ext cx="719280" cy="345600"/>
+          </a:xfrm>
+          <a:prstGeom prst="rect">
+            <a:avLst/>
+          </a:prstGeom>
+          <a:noFill/>
+          <a:ln>
+            <a:noFill/>
+          </a:ln>
+        </p:spPr>
+        <p:style>
+          <a:lnRef idx="0"/>
+          <a:fillRef idx="0"/>
+          <a:effectRef idx="0"/>
+          <a:fontRef idx="minor"/>
+        </p:style>
         <p:txBody>
           <a:bodyPr lIns="90000" rIns="90000" tIns="45000" bIns="45000">
             <a:noAutofit/>
@@ -1685,7 +3599,62 @@
             </a:pPr>
             <a:r>
               <a:rPr b="0" lang="en-GB" sz="1800" spc="-1" strike="noStrike">
-                <a:latin typeface="Arial"/>
+                <a:solidFill>
+                  <a:srgbClr val="000000"/>
+                </a:solidFill>
+                <a:latin typeface="Arial"/>
+                <a:ea typeface="DejaVu Sans"/>
+              </a:rPr>
+              <a:t>C</a:t>
+            </a:r>
+            <a:endParaRPr b="0" lang="en-GB" sz="1800" spc="-1" strike="noStrike">
+              <a:latin typeface="Arial"/>
+            </a:endParaRPr>
+          </a:p>
+        </p:txBody>
+      </p:sp>
+      <p:sp>
+        <p:nvSpPr>
+          <p:cNvPr id="90" name="CustomShape 51"/>
+          <p:cNvSpPr/>
+          <p:nvPr/>
+        </p:nvSpPr>
+        <p:spPr>
+          <a:xfrm>
+            <a:off x="5832000" y="3830400"/>
+            <a:ext cx="719280" cy="345600"/>
+          </a:xfrm>
+          <a:prstGeom prst="rect">
+            <a:avLst/>
+          </a:prstGeom>
+          <a:noFill/>
+          <a:ln>
+            <a:noFill/>
+          </a:ln>
+        </p:spPr>
+        <p:style>
+          <a:lnRef idx="0"/>
+          <a:fillRef idx="0"/>
+          <a:effectRef idx="0"/>
+          <a:fontRef idx="minor"/>
+        </p:style>
+        <p:txBody>
+          <a:bodyPr lIns="90000" rIns="90000" tIns="45000" bIns="45000">
+            <a:noAutofit/>
+          </a:bodyPr>
+          <a:p>
+            <a:pPr>
+              <a:lnSpc>
+                <a:spcPct val="100000"/>
+              </a:lnSpc>
+            </a:pPr>
+            <a:r>
+              <a:rPr b="0" lang="en-GB" sz="1800" spc="-1" strike="noStrike">
+                <a:solidFill>
+                  <a:srgbClr val="000000"/>
+                </a:solidFill>
+                <a:latin typeface="Arial"/>
+                <a:ea typeface="DejaVu Sans"/>
               </a:rPr>
               <a:t>D</a:t>
             </a:r>

</xml_diff>